<commit_message>
Modified ppt and ReadMe
</commit_message>
<xml_diff>
--- a/LendingClubCaseStudy.pptx
+++ b/LendingClubCaseStudy.pptx
@@ -7897,11 +7897,7 @@
             </a:r>
             <a:r>
               <a:rPr lang="en-GB" sz="2900" b="1" dirty="0"/>
-              <a:t>Numerical </a:t>
-            </a:r>
-            <a:r>
-              <a:rPr lang="en-GB" sz="2900" b="1" dirty="0" err="1"/>
-              <a:t>anlysis</a:t>
+              <a:t>Numerical analysis</a:t>
             </a:r>
             <a:r>
               <a:rPr lang="en-GB" sz="2900" dirty="0"/>
@@ -7913,7 +7909,7 @@
             </a:r>
             <a:r>
               <a:rPr lang="en-GB" sz="2900" dirty="0"/>
-              <a:t>show a higher risk of default, as well as loans with lower annual income </a:t>
+              <a:t>show a higher risk of default, as well as loans taken by employees with lower annual income </a:t>
             </a:r>
             <a:r>
               <a:rPr lang="en-GB" sz="2900" b="1" dirty="0"/>
@@ -7941,7 +7937,15 @@
             </a:r>
             <a:r>
               <a:rPr lang="en-GB" sz="2900" b="1" dirty="0"/>
-              <a:t>annual income and loan amounts </a:t>
+              <a:t>annual income </a:t>
+            </a:r>
+            <a:r>
+              <a:rPr lang="en-GB" sz="2900" dirty="0"/>
+              <a:t>and</a:t>
+            </a:r>
+            <a:r>
+              <a:rPr lang="en-GB" sz="2900" b="1" dirty="0"/>
+              <a:t> loan amounts </a:t>
             </a:r>
             <a:r>
               <a:rPr lang="en-GB" sz="2900" dirty="0"/>
@@ -10978,7 +10982,7 @@
         <p:spPr>
           <a:xfrm>
             <a:off x="505618" y="1513308"/>
-            <a:ext cx="11180763" cy="3260572"/>
+            <a:ext cx="11164959" cy="3260572"/>
           </a:xfrm>
           <a:prstGeom prst="rect">
             <a:avLst/>

</xml_diff>

<commit_message>
Added Analysi of Param Debt to Income Ratio
</commit_message>
<xml_diff>
--- a/LendingClubCaseStudy.pptx
+++ b/LendingClubCaseStudy.pptx
@@ -116,6 +116,11 @@
       </a:defRPr>
     </a:lvl9pPr>
   </p:defaultTextStyle>
+  <p:extLst>
+    <p:ext uri="{EFAFB233-063F-42B5-8137-9DF3F51BA10A}">
+      <p15:sldGuideLst xmlns:p15="http://schemas.microsoft.com/office/powerpoint/2012/main"/>
+    </p:ext>
+  </p:extLst>
 </p:presentation>
 </file>
 
@@ -7901,11 +7906,19 @@
             </a:r>
             <a:r>
               <a:rPr lang="en-GB" sz="2900" dirty="0"/>
-              <a:t>, loans with higher </a:t>
+              <a:t>, loans with </a:t>
             </a:r>
             <a:r>
               <a:rPr lang="en-GB" sz="2900" b="1" dirty="0"/>
-              <a:t>interest rates (int_rate) </a:t>
+              <a:t>higher</a:t>
+            </a:r>
+            <a:r>
+              <a:rPr lang="en-GB" sz="2900" dirty="0"/>
+              <a:t> </a:t>
+            </a:r>
+            <a:r>
+              <a:rPr lang="en-GB" sz="2900" b="1" dirty="0"/>
+              <a:t>interest rates (int_rate)  or higher Debt to Income Ratio </a:t>
             </a:r>
             <a:r>
               <a:rPr lang="en-GB" sz="2900" dirty="0"/>
@@ -7925,7 +7938,7 @@
             </a:r>
             <a:r>
               <a:rPr lang="en-GB" sz="2900" dirty="0"/>
-              <a:t>and higher loan amounts </a:t>
+              <a:t>or higher loan amounts </a:t>
             </a:r>
             <a:r>
               <a:rPr lang="en-GB" sz="2900" b="1" dirty="0"/>
@@ -7945,7 +7958,7 @@
             </a:r>
             <a:r>
               <a:rPr lang="en-GB" sz="2900" b="1" dirty="0"/>
-              <a:t> loan amounts </a:t>
+              <a:t> loan amounts with loan status </a:t>
             </a:r>
             <a:r>
               <a:rPr lang="en-GB" sz="2900" dirty="0"/>
@@ -10959,38 +10972,6 @@
       </p:sp>
       <p:pic>
         <p:nvPicPr>
-          <p:cNvPr id="6" name="Content Placeholder 5">
-            <a:extLst>
-              <a:ext uri="{FF2B5EF4-FFF2-40B4-BE49-F238E27FC236}">
-                <a16:creationId xmlns:a16="http://schemas.microsoft.com/office/drawing/2014/main" id="{91476DD8-FF72-3F34-8068-AB058EFC5207}"/>
-              </a:ext>
-            </a:extLst>
-          </p:cNvPr>
-          <p:cNvPicPr>
-            <a:picLocks noGrp="1" noChangeAspect="1"/>
-          </p:cNvPicPr>
-          <p:nvPr>
-            <p:ph idx="1"/>
-          </p:nvPr>
-        </p:nvPicPr>
-        <p:blipFill>
-          <a:blip r:embed="rId2"/>
-          <a:stretch>
-            <a:fillRect/>
-          </a:stretch>
-        </p:blipFill>
-        <p:spPr>
-          <a:xfrm>
-            <a:off x="505618" y="1513308"/>
-            <a:ext cx="11164959" cy="3260572"/>
-          </a:xfrm>
-          <a:prstGeom prst="rect">
-            <a:avLst/>
-          </a:prstGeom>
-        </p:spPr>
-      </p:pic>
-      <p:pic>
-        <p:nvPicPr>
           <p:cNvPr id="7" name="Picture 6">
             <a:extLst>
               <a:ext uri="{FF2B5EF4-FFF2-40B4-BE49-F238E27FC236}">
@@ -11004,7 +10985,7 @@
           <p:nvPr/>
         </p:nvPicPr>
         <p:blipFill>
-          <a:blip r:embed="rId3"/>
+          <a:blip r:embed="rId2"/>
           <a:stretch>
             <a:fillRect/>
           </a:stretch>
@@ -11061,6 +11042,14 @@
             </a:r>
             <a:r>
               <a:rPr lang="en-GB" dirty="0" err="1"/>
+              <a:t>dti</a:t>
+            </a:r>
+            <a:r>
+              <a:rPr lang="en-GB" dirty="0"/>
+              <a:t>’, ‘</a:t>
+            </a:r>
+            <a:r>
+              <a:rPr lang="en-GB" dirty="0" err="1"/>
               <a:t>loan_amt</a:t>
             </a:r>
             <a:r>
@@ -11100,8 +11089,8 @@
         </p:nvSpPr>
         <p:spPr>
           <a:xfrm>
-            <a:off x="697777" y="4975360"/>
-            <a:ext cx="10972800" cy="2031325"/>
+            <a:off x="678556" y="4549676"/>
+            <a:ext cx="10972800" cy="2308324"/>
           </a:xfrm>
           <a:prstGeom prst="rect">
             <a:avLst/>
@@ -11159,6 +11148,62 @@
               <a:buChar char="•"/>
             </a:pPr>
             <a:r>
+              <a:rPr lang="en-GB" b="0" i="0" dirty="0">
+                <a:effectLst/>
+                <a:highlight>
+                  <a:srgbClr val="FFFFFF"/>
+                </a:highlight>
+                <a:latin typeface="system-ui"/>
+              </a:rPr>
+              <a:t> </a:t>
+            </a:r>
+            <a:r>
+              <a:rPr lang="en-GB" b="1" i="0" dirty="0" err="1">
+                <a:effectLst/>
+                <a:highlight>
+                  <a:srgbClr val="FFFFFF"/>
+                </a:highlight>
+                <a:latin typeface="system-ui"/>
+              </a:rPr>
+              <a:t>dti</a:t>
+            </a:r>
+            <a:r>
+              <a:rPr lang="en-GB" b="0" i="0" dirty="0">
+                <a:effectLst/>
+                <a:highlight>
+                  <a:srgbClr val="FFFFFF"/>
+                </a:highlight>
+                <a:latin typeface="system-ui"/>
+              </a:rPr>
+              <a:t> (Debt to Interest Rate Ratio) indicates that higher </a:t>
+            </a:r>
+            <a:r>
+              <a:rPr lang="en-GB" b="0" i="0" dirty="0" err="1">
+                <a:effectLst/>
+                <a:highlight>
+                  <a:srgbClr val="FFFFFF"/>
+                </a:highlight>
+                <a:latin typeface="system-ui"/>
+              </a:rPr>
+              <a:t>dti</a:t>
+            </a:r>
+            <a:r>
+              <a:rPr lang="en-GB" b="0" i="0" dirty="0">
+                <a:effectLst/>
+                <a:highlight>
+                  <a:srgbClr val="FFFFFF"/>
+                </a:highlight>
+                <a:latin typeface="system-ui"/>
+              </a:rPr>
+              <a:t> ratio are at higher risk of getting Defaulted</a:t>
+            </a:r>
+          </a:p>
+          <a:p>
+            <a:pPr>
+              <a:buFont typeface="Arial" panose="020B0604020202020204" pitchFamily="34" charset="0"/>
+              <a:buChar char="•"/>
+            </a:pPr>
+            <a:r>
               <a:rPr lang="en-GB" b="1" i="0" dirty="0">
                 <a:effectLst/>
                 <a:highlight>
@@ -11240,6 +11285,64 @@
           </a:p>
         </p:txBody>
       </p:sp>
+      <p:sp>
+        <p:nvSpPr>
+          <p:cNvPr id="3" name="Content Placeholder 2">
+            <a:extLst>
+              <a:ext uri="{FF2B5EF4-FFF2-40B4-BE49-F238E27FC236}">
+                <a16:creationId xmlns:a16="http://schemas.microsoft.com/office/drawing/2014/main" id="{9B6036FE-E69D-95E8-1005-D32A5E5EEBD9}"/>
+              </a:ext>
+            </a:extLst>
+          </p:cNvPr>
+          <p:cNvSpPr>
+            <a:spLocks noGrp="1"/>
+          </p:cNvSpPr>
+          <p:nvPr>
+            <p:ph idx="1"/>
+          </p:nvPr>
+        </p:nvSpPr>
+        <p:spPr/>
+        <p:txBody>
+          <a:bodyPr/>
+          <a:lstStyle/>
+          <a:p>
+            <a:r>
+              <a:rPr lang="en-GB" dirty="0"/>
+              <a:t>i</a:t>
+            </a:r>
+          </a:p>
+        </p:txBody>
+      </p:sp>
+      <p:pic>
+        <p:nvPicPr>
+          <p:cNvPr id="10" name="Picture 9">
+            <a:extLst>
+              <a:ext uri="{FF2B5EF4-FFF2-40B4-BE49-F238E27FC236}">
+                <a16:creationId xmlns:a16="http://schemas.microsoft.com/office/drawing/2014/main" id="{A1D34708-DC86-4ECA-0321-C0CEF32440D6}"/>
+              </a:ext>
+            </a:extLst>
+          </p:cNvPr>
+          <p:cNvPicPr>
+            <a:picLocks noChangeAspect="1"/>
+          </p:cNvPicPr>
+          <p:nvPr/>
+        </p:nvPicPr>
+        <p:blipFill>
+          <a:blip r:embed="rId3"/>
+          <a:stretch>
+            <a:fillRect/>
+          </a:stretch>
+        </p:blipFill>
+        <p:spPr>
+          <a:xfrm>
+            <a:off x="540644" y="1384263"/>
+            <a:ext cx="10972800" cy="3243170"/>
+          </a:xfrm>
+          <a:prstGeom prst="rect">
+            <a:avLst/>
+          </a:prstGeom>
+        </p:spPr>
+      </p:pic>
     </p:spTree>
     <p:extLst>
       <p:ext uri="{BB962C8B-B14F-4D97-AF65-F5344CB8AC3E}">
@@ -12167,7 +12270,27 @@
                 </a:highlight>
                 <a:latin typeface="system-ui"/>
               </a:rPr>
-              <a:t> , the purpose named “small business” has a higher probability of getting defaulted in comparison to other purposes</a:t>
+              <a:t> , the purpose named </a:t>
+            </a:r>
+            <a:r>
+              <a:rPr lang="en-GB" b="1" i="0" dirty="0">
+                <a:effectLst/>
+                <a:highlight>
+                  <a:srgbClr val="FFFFFF"/>
+                </a:highlight>
+                <a:latin typeface="system-ui"/>
+              </a:rPr>
+              <a:t>“small business” </a:t>
+            </a:r>
+            <a:r>
+              <a:rPr lang="en-GB" b="0" i="0" dirty="0">
+                <a:effectLst/>
+                <a:highlight>
+                  <a:srgbClr val="FFFFFF"/>
+                </a:highlight>
+                <a:latin typeface="system-ui"/>
+              </a:rPr>
+              <a:t>has a higher probability of getting defaulted in comparison to other purposes</a:t>
             </a:r>
           </a:p>
           <a:p>

</xml_diff>

<commit_message>
Added Heat Map as part of the presentation
</commit_message>
<xml_diff>
--- a/LendingClubCaseStudy.pptx
+++ b/LendingClubCaseStudy.pptx
@@ -5,19 +5,20 @@
     <p:sldMasterId id="2147483648" r:id="rId1"/>
   </p:sldMasterIdLst>
   <p:notesMasterIdLst>
-    <p:notesMasterId r:id="rId12"/>
+    <p:notesMasterId r:id="rId13"/>
   </p:notesMasterIdLst>
   <p:sldIdLst>
     <p:sldId id="257" r:id="rId2"/>
     <p:sldId id="258" r:id="rId3"/>
     <p:sldId id="262" r:id="rId4"/>
     <p:sldId id="259" r:id="rId5"/>
-    <p:sldId id="267" r:id="rId6"/>
-    <p:sldId id="268" r:id="rId7"/>
-    <p:sldId id="269" r:id="rId8"/>
-    <p:sldId id="266" r:id="rId9"/>
-    <p:sldId id="270" r:id="rId10"/>
-    <p:sldId id="264" r:id="rId11"/>
+    <p:sldId id="272" r:id="rId6"/>
+    <p:sldId id="267" r:id="rId7"/>
+    <p:sldId id="268" r:id="rId8"/>
+    <p:sldId id="269" r:id="rId9"/>
+    <p:sldId id="266" r:id="rId10"/>
+    <p:sldId id="270" r:id="rId11"/>
+    <p:sldId id="264" r:id="rId12"/>
   </p:sldIdLst>
   <p:sldSz cx="12192000" cy="6858000"/>
   <p:notesSz cx="6858000" cy="9144000"/>
@@ -3475,7 +3476,7 @@
           <a:p>
             <a:fld id="{24975932-DF6A-4632-8349-D8F7046C48F4}" type="slidenum">
               <a:rPr lang="en-GB" smtClean="0"/>
-              <a:t>7</a:t>
+              <a:t>8</a:t>
             </a:fld>
             <a:endParaRPr lang="en-GB"/>
           </a:p>
@@ -3559,7 +3560,7 @@
           <a:p>
             <a:fld id="{24975932-DF6A-4632-8349-D8F7046C48F4}" type="slidenum">
               <a:rPr lang="en-GB" smtClean="0"/>
-              <a:t>8</a:t>
+              <a:t>9</a:t>
             </a:fld>
             <a:endParaRPr lang="en-GB"/>
           </a:p>
@@ -3643,7 +3644,7 @@
           <a:p>
             <a:fld id="{24975932-DF6A-4632-8349-D8F7046C48F4}" type="slidenum">
               <a:rPr lang="en-GB" smtClean="0"/>
-              <a:t>9</a:t>
+              <a:t>10</a:t>
             </a:fld>
             <a:endParaRPr lang="en-GB"/>
           </a:p>
@@ -7864,6 +7865,513 @@
       </p:grpSpPr>
       <p:sp>
         <p:nvSpPr>
+          <p:cNvPr id="5" name="Title 1">
+            <a:extLst>
+              <a:ext uri="{FF2B5EF4-FFF2-40B4-BE49-F238E27FC236}">
+                <a16:creationId xmlns:a16="http://schemas.microsoft.com/office/drawing/2014/main" id="{00C4D573-60F6-882F-6BED-51E9C908CC76}"/>
+              </a:ext>
+            </a:extLst>
+          </p:cNvPr>
+          <p:cNvSpPr>
+            <a:spLocks noGrp="1"/>
+          </p:cNvSpPr>
+          <p:nvPr>
+            <p:ph type="title"/>
+          </p:nvPr>
+        </p:nvSpPr>
+        <p:spPr>
+          <a:xfrm>
+            <a:off x="398029" y="103398"/>
+            <a:ext cx="11572297" cy="703263"/>
+          </a:xfrm>
+          <a:solidFill>
+            <a:schemeClr val="accent1">
+              <a:lumMod val="75000"/>
+            </a:schemeClr>
+          </a:solidFill>
+        </p:spPr>
+        <p:txBody>
+          <a:bodyPr>
+            <a:normAutofit/>
+          </a:bodyPr>
+          <a:lstStyle/>
+          <a:p>
+            <a:pPr algn="just"/>
+            <a:r>
+              <a:rPr lang="en-GB" sz="4000" dirty="0"/>
+              <a:t>                  </a:t>
+            </a:r>
+            <a:r>
+              <a:rPr lang="en-GB" sz="2800" dirty="0">
+                <a:solidFill>
+                  <a:schemeClr val="bg2"/>
+                </a:solidFill>
+              </a:rPr>
+              <a:t>Analysis :Bivariate Analysis of Categorical Fields</a:t>
+            </a:r>
+          </a:p>
+        </p:txBody>
+      </p:sp>
+      <p:pic>
+        <p:nvPicPr>
+          <p:cNvPr id="7" name="Picture 6">
+            <a:extLst>
+              <a:ext uri="{FF2B5EF4-FFF2-40B4-BE49-F238E27FC236}">
+                <a16:creationId xmlns:a16="http://schemas.microsoft.com/office/drawing/2014/main" id="{83F5A113-F0D8-A33D-0CD2-E12E3547041E}"/>
+              </a:ext>
+            </a:extLst>
+          </p:cNvPr>
+          <p:cNvPicPr>
+            <a:picLocks noChangeAspect="1"/>
+          </p:cNvPicPr>
+          <p:nvPr/>
+        </p:nvPicPr>
+        <p:blipFill>
+          <a:blip r:embed="rId3"/>
+          <a:stretch>
+            <a:fillRect/>
+          </a:stretch>
+        </p:blipFill>
+        <p:spPr>
+          <a:xfrm>
+            <a:off x="540644" y="240635"/>
+            <a:ext cx="838556" cy="428788"/>
+          </a:xfrm>
+          <a:prstGeom prst="rect">
+            <a:avLst/>
+          </a:prstGeom>
+        </p:spPr>
+      </p:pic>
+      <p:sp>
+        <p:nvSpPr>
+          <p:cNvPr id="8" name="TextBox 7">
+            <a:extLst>
+              <a:ext uri="{FF2B5EF4-FFF2-40B4-BE49-F238E27FC236}">
+                <a16:creationId xmlns:a16="http://schemas.microsoft.com/office/drawing/2014/main" id="{9A75BAFA-1C42-2E14-3759-6472BB60C57C}"/>
+              </a:ext>
+            </a:extLst>
+          </p:cNvPr>
+          <p:cNvSpPr txBox="1"/>
+          <p:nvPr/>
+        </p:nvSpPr>
+        <p:spPr>
+          <a:xfrm>
+            <a:off x="398029" y="806660"/>
+            <a:ext cx="10972800" cy="369332"/>
+          </a:xfrm>
+          <a:prstGeom prst="rect">
+            <a:avLst/>
+          </a:prstGeom>
+          <a:noFill/>
+        </p:spPr>
+        <p:txBody>
+          <a:bodyPr wrap="square" rtlCol="0">
+            <a:spAutoFit/>
+          </a:bodyPr>
+          <a:lstStyle/>
+          <a:p>
+            <a:r>
+              <a:rPr lang="en-GB" b="1" dirty="0" err="1"/>
+              <a:t>OutCome</a:t>
+            </a:r>
+            <a:r>
+              <a:rPr lang="en-GB" b="1" dirty="0"/>
+              <a:t> of Bivariate Analysis for Categorical </a:t>
+            </a:r>
+            <a:r>
+              <a:rPr lang="en-GB" b="1" dirty="0" err="1"/>
+              <a:t>Fileds</a:t>
+            </a:r>
+            <a:endParaRPr lang="en-GB" b="1" dirty="0"/>
+          </a:p>
+        </p:txBody>
+      </p:sp>
+      <p:sp>
+        <p:nvSpPr>
+          <p:cNvPr id="4" name="TextBox 3">
+            <a:extLst>
+              <a:ext uri="{FF2B5EF4-FFF2-40B4-BE49-F238E27FC236}">
+                <a16:creationId xmlns:a16="http://schemas.microsoft.com/office/drawing/2014/main" id="{8B156778-DAE0-2F83-7C3D-A9F2E74D2859}"/>
+              </a:ext>
+            </a:extLst>
+          </p:cNvPr>
+          <p:cNvSpPr txBox="1"/>
+          <p:nvPr/>
+        </p:nvSpPr>
+        <p:spPr>
+          <a:xfrm>
+            <a:off x="540644" y="1488558"/>
+            <a:ext cx="11229598" cy="4801314"/>
+          </a:xfrm>
+          <a:prstGeom prst="rect">
+            <a:avLst/>
+          </a:prstGeom>
+          <a:noFill/>
+        </p:spPr>
+        <p:txBody>
+          <a:bodyPr wrap="square" rtlCol="0">
+            <a:spAutoFit/>
+          </a:bodyPr>
+          <a:lstStyle/>
+          <a:p>
+            <a:pPr algn="l">
+              <a:buFont typeface="Arial" panose="020B0604020202020204" pitchFamily="34" charset="0"/>
+              <a:buChar char="•"/>
+            </a:pPr>
+            <a:r>
+              <a:rPr lang="en-GB" b="0" i="0" dirty="0">
+                <a:effectLst/>
+                <a:highlight>
+                  <a:srgbClr val="FFFFFF"/>
+                </a:highlight>
+                <a:latin typeface="system-ui"/>
+              </a:rPr>
+              <a:t>The following Categorical Variables have a considerable impact on Loan getting Defaulted</a:t>
+            </a:r>
+          </a:p>
+          <a:p>
+            <a:pPr marL="742950" lvl="1" indent="-285750" algn="l">
+              <a:buFont typeface="Arial" panose="020B0604020202020204" pitchFamily="34" charset="0"/>
+              <a:buChar char="•"/>
+            </a:pPr>
+            <a:r>
+              <a:rPr lang="en-GB" b="1" i="0" dirty="0">
+                <a:effectLst/>
+                <a:highlight>
+                  <a:srgbClr val="FFFFFF"/>
+                </a:highlight>
+                <a:latin typeface="system-ui"/>
+              </a:rPr>
+              <a:t>term</a:t>
+            </a:r>
+            <a:r>
+              <a:rPr lang="en-GB" b="0" i="0" dirty="0">
+                <a:effectLst/>
+                <a:highlight>
+                  <a:srgbClr val="FFFFFF"/>
+                </a:highlight>
+                <a:latin typeface="system-ui"/>
+              </a:rPr>
+              <a:t> , Higher Term like 60 months are at a higher risk of getting defaulted</a:t>
+            </a:r>
+          </a:p>
+          <a:p>
+            <a:pPr marL="742950" lvl="1" indent="-285750" algn="l">
+              <a:buFont typeface="Arial" panose="020B0604020202020204" pitchFamily="34" charset="0"/>
+              <a:buChar char="•"/>
+            </a:pPr>
+            <a:r>
+              <a:rPr lang="en-GB" b="1" i="0" dirty="0">
+                <a:effectLst/>
+                <a:highlight>
+                  <a:srgbClr val="FFFFFF"/>
+                </a:highlight>
+                <a:latin typeface="system-ui"/>
+              </a:rPr>
+              <a:t>grade and </a:t>
+            </a:r>
+            <a:r>
+              <a:rPr lang="en-GB" b="1" i="0" dirty="0" err="1">
+                <a:effectLst/>
+                <a:highlight>
+                  <a:srgbClr val="FFFFFF"/>
+                </a:highlight>
+                <a:latin typeface="system-ui"/>
+              </a:rPr>
+              <a:t>sub_grade</a:t>
+            </a:r>
+            <a:r>
+              <a:rPr lang="en-GB" b="0" i="0" dirty="0">
+                <a:effectLst/>
+                <a:highlight>
+                  <a:srgbClr val="FFFFFF"/>
+                </a:highlight>
+                <a:latin typeface="system-ui"/>
+              </a:rPr>
+              <a:t> , lower the grade then higher is the risk of getting defaulted</a:t>
+            </a:r>
+          </a:p>
+          <a:p>
+            <a:pPr marL="742950" lvl="1" indent="-285750" algn="l">
+              <a:buFont typeface="Arial" panose="020B0604020202020204" pitchFamily="34" charset="0"/>
+              <a:buChar char="•"/>
+            </a:pPr>
+            <a:r>
+              <a:rPr lang="en-GB" b="1" i="0" dirty="0">
+                <a:effectLst/>
+                <a:highlight>
+                  <a:srgbClr val="FFFFFF"/>
+                </a:highlight>
+                <a:latin typeface="system-ui"/>
+              </a:rPr>
+              <a:t>purpose</a:t>
+            </a:r>
+            <a:r>
+              <a:rPr lang="en-GB" b="0" i="0" dirty="0">
+                <a:effectLst/>
+                <a:highlight>
+                  <a:srgbClr val="FFFFFF"/>
+                </a:highlight>
+                <a:latin typeface="system-ui"/>
+              </a:rPr>
+              <a:t> , the purpose named </a:t>
+            </a:r>
+            <a:r>
+              <a:rPr lang="en-GB" b="1" i="0" dirty="0">
+                <a:effectLst/>
+                <a:highlight>
+                  <a:srgbClr val="FFFFFF"/>
+                </a:highlight>
+                <a:latin typeface="system-ui"/>
+              </a:rPr>
+              <a:t>“small business” </a:t>
+            </a:r>
+            <a:r>
+              <a:rPr lang="en-GB" b="0" i="0" dirty="0">
+                <a:effectLst/>
+                <a:highlight>
+                  <a:srgbClr val="FFFFFF"/>
+                </a:highlight>
+                <a:latin typeface="system-ui"/>
+              </a:rPr>
+              <a:t>has a higher probability of getting defaulted in comparison to other purposes</a:t>
+            </a:r>
+          </a:p>
+          <a:p>
+            <a:pPr marL="742950" lvl="1" indent="-285750" algn="l">
+              <a:buFont typeface="Arial" panose="020B0604020202020204" pitchFamily="34" charset="0"/>
+              <a:buChar char="•"/>
+            </a:pPr>
+            <a:r>
+              <a:rPr lang="en-GB" b="1" i="0" dirty="0" err="1">
+                <a:effectLst/>
+                <a:highlight>
+                  <a:srgbClr val="FFFFFF"/>
+                </a:highlight>
+                <a:latin typeface="system-ui"/>
+              </a:rPr>
+              <a:t>addr_state</a:t>
+            </a:r>
+            <a:r>
+              <a:rPr lang="en-GB" b="0" i="0" dirty="0">
+                <a:effectLst/>
+                <a:highlight>
+                  <a:srgbClr val="FFFFFF"/>
+                </a:highlight>
+                <a:latin typeface="system-ui"/>
+              </a:rPr>
+              <a:t> , the state 'NE' has a higher probability of getting defaulted though the count of samples considered are very less</a:t>
+            </a:r>
+          </a:p>
+          <a:p>
+            <a:pPr marL="742950" lvl="1" indent="-285750" algn="l">
+              <a:buFont typeface="Arial" panose="020B0604020202020204" pitchFamily="34" charset="0"/>
+              <a:buChar char="•"/>
+            </a:pPr>
+            <a:r>
+              <a:rPr lang="en-GB" b="1" i="0" dirty="0" err="1">
+                <a:effectLst/>
+                <a:highlight>
+                  <a:srgbClr val="FFFFFF"/>
+                </a:highlight>
+                <a:latin typeface="system-ui"/>
+              </a:rPr>
+              <a:t>pub_rec_bankruptcies</a:t>
+            </a:r>
+            <a:r>
+              <a:rPr lang="en-GB" b="0" i="0" dirty="0">
+                <a:effectLst/>
+                <a:highlight>
+                  <a:srgbClr val="FFFFFF"/>
+                </a:highlight>
+                <a:latin typeface="system-ui"/>
+              </a:rPr>
+              <a:t>, higher the number of publicly recorded bankruptcies relates to higher risk of getting Defaulted</a:t>
+            </a:r>
+            <a:br>
+              <a:rPr lang="en-GB" b="0" i="0" dirty="0">
+                <a:effectLst/>
+                <a:highlight>
+                  <a:srgbClr val="FFFFFF"/>
+                </a:highlight>
+                <a:latin typeface="system-ui"/>
+              </a:rPr>
+            </a:br>
+            <a:endParaRPr lang="en-GB" b="0" i="0" dirty="0">
+              <a:effectLst/>
+              <a:highlight>
+                <a:srgbClr val="FFFFFF"/>
+              </a:highlight>
+              <a:latin typeface="system-ui"/>
+            </a:endParaRPr>
+          </a:p>
+          <a:p>
+            <a:pPr algn="l">
+              <a:buFont typeface="Arial" panose="020B0604020202020204" pitchFamily="34" charset="0"/>
+              <a:buChar char="•"/>
+            </a:pPr>
+            <a:r>
+              <a:rPr lang="en-GB" b="0" i="0" dirty="0">
+                <a:effectLst/>
+                <a:highlight>
+                  <a:srgbClr val="FFFFFF"/>
+                </a:highlight>
+                <a:latin typeface="system-ui"/>
+              </a:rPr>
+              <a:t>The following Categorical Variables do not have a significant or prominent impact on Loan getting Defaulted</a:t>
+            </a:r>
+          </a:p>
+          <a:p>
+            <a:pPr marL="742950" lvl="1" indent="-285750" algn="l">
+              <a:buFont typeface="Arial" panose="020B0604020202020204" pitchFamily="34" charset="0"/>
+              <a:buChar char="•"/>
+            </a:pPr>
+            <a:r>
+              <a:rPr lang="en-GB" b="1" i="0" dirty="0" err="1">
+                <a:effectLst/>
+                <a:highlight>
+                  <a:srgbClr val="FFFFFF"/>
+                </a:highlight>
+                <a:latin typeface="system-ui"/>
+              </a:rPr>
+              <a:t>emp_length</a:t>
+            </a:r>
+            <a:endParaRPr lang="en-GB" b="0" i="0" dirty="0">
+              <a:effectLst/>
+              <a:highlight>
+                <a:srgbClr val="FFFFFF"/>
+              </a:highlight>
+              <a:latin typeface="system-ui"/>
+            </a:endParaRPr>
+          </a:p>
+          <a:p>
+            <a:pPr marL="742950" lvl="1" indent="-285750" algn="l">
+              <a:buFont typeface="Arial" panose="020B0604020202020204" pitchFamily="34" charset="0"/>
+              <a:buChar char="•"/>
+            </a:pPr>
+            <a:r>
+              <a:rPr lang="en-GB" b="1" i="0" dirty="0" err="1">
+                <a:effectLst/>
+                <a:highlight>
+                  <a:srgbClr val="FFFFFF"/>
+                </a:highlight>
+                <a:latin typeface="system-ui"/>
+              </a:rPr>
+              <a:t>home_ownership</a:t>
+            </a:r>
+            <a:endParaRPr lang="en-GB" b="0" i="0" dirty="0">
+              <a:effectLst/>
+              <a:highlight>
+                <a:srgbClr val="FFFFFF"/>
+              </a:highlight>
+              <a:latin typeface="system-ui"/>
+            </a:endParaRPr>
+          </a:p>
+          <a:p>
+            <a:pPr marL="742950" lvl="1" indent="-285750" algn="l">
+              <a:buFont typeface="Arial" panose="020B0604020202020204" pitchFamily="34" charset="0"/>
+              <a:buChar char="•"/>
+            </a:pPr>
+            <a:r>
+              <a:rPr lang="en-GB" b="1" i="0" dirty="0" err="1">
+                <a:effectLst/>
+                <a:highlight>
+                  <a:srgbClr val="FFFFFF"/>
+                </a:highlight>
+                <a:latin typeface="system-ui"/>
+              </a:rPr>
+              <a:t>verification_status</a:t>
+            </a:r>
+            <a:endParaRPr lang="en-GB" b="0" i="0" dirty="0">
+              <a:effectLst/>
+              <a:highlight>
+                <a:srgbClr val="FFFFFF"/>
+              </a:highlight>
+              <a:latin typeface="system-ui"/>
+            </a:endParaRPr>
+          </a:p>
+          <a:p>
+            <a:pPr marL="742950" lvl="1" indent="-285750" algn="l">
+              <a:buFont typeface="Arial" panose="020B0604020202020204" pitchFamily="34" charset="0"/>
+              <a:buChar char="•"/>
+            </a:pPr>
+            <a:r>
+              <a:rPr lang="en-GB" b="1" i="0" dirty="0" err="1">
+                <a:effectLst/>
+                <a:highlight>
+                  <a:srgbClr val="FFFFFF"/>
+                </a:highlight>
+                <a:latin typeface="system-ui"/>
+              </a:rPr>
+              <a:t>pub_rec</a:t>
+            </a:r>
+            <a:endParaRPr lang="en-GB" b="1" i="0" dirty="0">
+              <a:effectLst/>
+              <a:highlight>
+                <a:srgbClr val="FFFFFF"/>
+              </a:highlight>
+              <a:latin typeface="system-ui"/>
+            </a:endParaRPr>
+          </a:p>
+          <a:p>
+            <a:pPr marL="742950" lvl="1" indent="-285750" algn="l">
+              <a:buFont typeface="Arial" panose="020B0604020202020204" pitchFamily="34" charset="0"/>
+              <a:buChar char="•"/>
+            </a:pPr>
+            <a:r>
+              <a:rPr lang="en-GB" b="1" dirty="0" err="1">
+                <a:highlight>
+                  <a:srgbClr val="FFFFFF"/>
+                </a:highlight>
+                <a:latin typeface="system-ui"/>
+              </a:rPr>
+              <a:t>issue_d</a:t>
+            </a:r>
+            <a:endParaRPr lang="en-GB" b="0" i="0" dirty="0">
+              <a:effectLst/>
+              <a:highlight>
+                <a:srgbClr val="FFFFFF"/>
+              </a:highlight>
+              <a:latin typeface="system-ui"/>
+            </a:endParaRPr>
+          </a:p>
+          <a:p>
+            <a:endParaRPr lang="en-GB" dirty="0"/>
+          </a:p>
+        </p:txBody>
+      </p:sp>
+    </p:spTree>
+    <p:extLst>
+      <p:ext uri="{BB962C8B-B14F-4D97-AF65-F5344CB8AC3E}">
+        <p14:creationId xmlns:p14="http://schemas.microsoft.com/office/powerpoint/2010/main" val="975904479"/>
+      </p:ext>
+    </p:extLst>
+  </p:cSld>
+  <p:clrMapOvr>
+    <a:masterClrMapping/>
+  </p:clrMapOvr>
+</p:sld>
+</file>
+
+<file path=ppt/slides/slide11.xml><?xml version="1.0" encoding="utf-8"?>
+<p:sld xmlns:a="http://schemas.openxmlformats.org/drawingml/2006/main" xmlns:r="http://schemas.openxmlformats.org/officeDocument/2006/relationships" xmlns:p="http://schemas.openxmlformats.org/presentationml/2006/main">
+  <p:cSld>
+    <p:spTree>
+      <p:nvGrpSpPr>
+        <p:cNvPr id="1" name=""/>
+        <p:cNvGrpSpPr/>
+        <p:nvPr/>
+      </p:nvGrpSpPr>
+      <p:grpSpPr>
+        <a:xfrm>
+          <a:off x="0" y="0"/>
+          <a:ext cx="0" cy="0"/>
+          <a:chOff x="0" y="0"/>
+          <a:chExt cx="0" cy="0"/>
+        </a:xfrm>
+      </p:grpSpPr>
+      <p:sp>
+        <p:nvSpPr>
           <p:cNvPr id="3" name="Content Placeholder 2">
             <a:extLst>
               <a:ext uri="{FF2B5EF4-FFF2-40B4-BE49-F238E27FC236}">
@@ -10894,6 +11402,221 @@
     </p:spTree>
     <p:extLst>
       <p:ext uri="{BB962C8B-B14F-4D97-AF65-F5344CB8AC3E}">
+        <p14:creationId xmlns:p14="http://schemas.microsoft.com/office/powerpoint/2010/main" val="1331464875"/>
+      </p:ext>
+    </p:extLst>
+  </p:cSld>
+  <p:clrMapOvr>
+    <a:masterClrMapping/>
+  </p:clrMapOvr>
+</p:sld>
+</file>
+
+<file path=ppt/slides/slide6.xml><?xml version="1.0" encoding="utf-8"?>
+<p:sld xmlns:a="http://schemas.openxmlformats.org/drawingml/2006/main" xmlns:r="http://schemas.openxmlformats.org/officeDocument/2006/relationships" xmlns:p="http://schemas.openxmlformats.org/presentationml/2006/main">
+  <p:cSld>
+    <p:spTree>
+      <p:nvGrpSpPr>
+        <p:cNvPr id="1" name=""/>
+        <p:cNvGrpSpPr/>
+        <p:nvPr/>
+      </p:nvGrpSpPr>
+      <p:grpSpPr>
+        <a:xfrm>
+          <a:off x="0" y="0"/>
+          <a:ext cx="0" cy="0"/>
+          <a:chOff x="0" y="0"/>
+          <a:chExt cx="0" cy="0"/>
+        </a:xfrm>
+      </p:grpSpPr>
+      <p:sp>
+        <p:nvSpPr>
+          <p:cNvPr id="5" name="Title 1">
+            <a:extLst>
+              <a:ext uri="{FF2B5EF4-FFF2-40B4-BE49-F238E27FC236}">
+                <a16:creationId xmlns:a16="http://schemas.microsoft.com/office/drawing/2014/main" id="{00C4D573-60F6-882F-6BED-51E9C908CC76}"/>
+              </a:ext>
+            </a:extLst>
+          </p:cNvPr>
+          <p:cNvSpPr>
+            <a:spLocks noGrp="1"/>
+          </p:cNvSpPr>
+          <p:nvPr>
+            <p:ph type="title"/>
+          </p:nvPr>
+        </p:nvSpPr>
+        <p:spPr>
+          <a:xfrm>
+            <a:off x="398029" y="103398"/>
+            <a:ext cx="11572297" cy="703263"/>
+          </a:xfrm>
+          <a:solidFill>
+            <a:schemeClr val="accent1">
+              <a:lumMod val="75000"/>
+            </a:schemeClr>
+          </a:solidFill>
+        </p:spPr>
+        <p:txBody>
+          <a:bodyPr>
+            <a:normAutofit/>
+          </a:bodyPr>
+          <a:lstStyle/>
+          <a:p>
+            <a:pPr algn="just"/>
+            <a:r>
+              <a:rPr lang="en-GB" sz="4000" dirty="0"/>
+              <a:t>                  </a:t>
+            </a:r>
+            <a:r>
+              <a:rPr lang="en-GB" sz="2800" dirty="0">
+                <a:solidFill>
+                  <a:schemeClr val="bg2"/>
+                </a:solidFill>
+              </a:rPr>
+              <a:t>Analysis :Univariate and Bivariate for Numeric</a:t>
+            </a:r>
+          </a:p>
+        </p:txBody>
+      </p:sp>
+      <p:pic>
+        <p:nvPicPr>
+          <p:cNvPr id="7" name="Picture 6">
+            <a:extLst>
+              <a:ext uri="{FF2B5EF4-FFF2-40B4-BE49-F238E27FC236}">
+                <a16:creationId xmlns:a16="http://schemas.microsoft.com/office/drawing/2014/main" id="{83F5A113-F0D8-A33D-0CD2-E12E3547041E}"/>
+              </a:ext>
+            </a:extLst>
+          </p:cNvPr>
+          <p:cNvPicPr>
+            <a:picLocks noChangeAspect="1"/>
+          </p:cNvPicPr>
+          <p:nvPr/>
+        </p:nvPicPr>
+        <p:blipFill>
+          <a:blip r:embed="rId2"/>
+          <a:stretch>
+            <a:fillRect/>
+          </a:stretch>
+        </p:blipFill>
+        <p:spPr>
+          <a:xfrm>
+            <a:off x="540644" y="240635"/>
+            <a:ext cx="838556" cy="428788"/>
+          </a:xfrm>
+          <a:prstGeom prst="rect">
+            <a:avLst/>
+          </a:prstGeom>
+        </p:spPr>
+      </p:pic>
+      <p:sp>
+        <p:nvSpPr>
+          <p:cNvPr id="4" name="TextBox 3">
+            <a:extLst>
+              <a:ext uri="{FF2B5EF4-FFF2-40B4-BE49-F238E27FC236}">
+                <a16:creationId xmlns:a16="http://schemas.microsoft.com/office/drawing/2014/main" id="{5EBE504B-F349-A30E-5CD7-52B160C843F6}"/>
+              </a:ext>
+            </a:extLst>
+          </p:cNvPr>
+          <p:cNvSpPr txBox="1"/>
+          <p:nvPr/>
+        </p:nvSpPr>
+        <p:spPr>
+          <a:xfrm>
+            <a:off x="455665" y="862159"/>
+            <a:ext cx="12017828" cy="1477328"/>
+          </a:xfrm>
+          <a:prstGeom prst="rect">
+            <a:avLst/>
+          </a:prstGeom>
+          <a:noFill/>
+        </p:spPr>
+        <p:txBody>
+          <a:bodyPr wrap="square" rtlCol="0">
+            <a:spAutoFit/>
+          </a:bodyPr>
+          <a:lstStyle/>
+          <a:p>
+            <a:r>
+              <a:rPr lang="en-GB" b="1" dirty="0"/>
+              <a:t>Heat Map between the Numeric Fields along with Loan Status</a:t>
+            </a:r>
+          </a:p>
+          <a:p>
+            <a:r>
+              <a:rPr lang="en-GB" b="0" i="0" dirty="0">
+                <a:effectLst/>
+                <a:highlight>
+                  <a:srgbClr val="FFFFFF"/>
+                </a:highlight>
+                <a:latin typeface="system-ui"/>
+              </a:rPr>
+              <a:t>  </a:t>
+            </a:r>
+          </a:p>
+          <a:p>
+            <a:r>
+              <a:rPr lang="en-GB" dirty="0">
+                <a:highlight>
+                  <a:srgbClr val="FFFFFF"/>
+                </a:highlight>
+                <a:latin typeface="system-ui"/>
+              </a:rPr>
+              <a:t>             </a:t>
+            </a:r>
+          </a:p>
+          <a:p>
+            <a:endParaRPr lang="en-GB" b="0" i="0" dirty="0">
+              <a:effectLst/>
+              <a:highlight>
+                <a:srgbClr val="FFFFFF"/>
+              </a:highlight>
+              <a:latin typeface="system-ui"/>
+            </a:endParaRPr>
+          </a:p>
+          <a:p>
+            <a:endParaRPr lang="en-GB" b="0" i="0" dirty="0">
+              <a:effectLst/>
+              <a:highlight>
+                <a:srgbClr val="FFFFFF"/>
+              </a:highlight>
+              <a:latin typeface="system-ui"/>
+            </a:endParaRPr>
+          </a:p>
+        </p:txBody>
+      </p:sp>
+      <p:pic>
+        <p:nvPicPr>
+          <p:cNvPr id="3" name="Picture 2">
+            <a:extLst>
+              <a:ext uri="{FF2B5EF4-FFF2-40B4-BE49-F238E27FC236}">
+                <a16:creationId xmlns:a16="http://schemas.microsoft.com/office/drawing/2014/main" id="{95189275-7F3B-4A49-80A7-D8DABC7A51EE}"/>
+              </a:ext>
+            </a:extLst>
+          </p:cNvPr>
+          <p:cNvPicPr>
+            <a:picLocks noChangeAspect="1"/>
+          </p:cNvPicPr>
+          <p:nvPr/>
+        </p:nvPicPr>
+        <p:blipFill>
+          <a:blip r:embed="rId3"/>
+          <a:stretch>
+            <a:fillRect/>
+          </a:stretch>
+        </p:blipFill>
+        <p:spPr>
+          <a:xfrm>
+            <a:off x="540644" y="1600823"/>
+            <a:ext cx="10310306" cy="4932938"/>
+          </a:xfrm>
+          <a:prstGeom prst="rect">
+            <a:avLst/>
+          </a:prstGeom>
+        </p:spPr>
+      </p:pic>
+    </p:spTree>
+    <p:extLst>
+      <p:ext uri="{BB962C8B-B14F-4D97-AF65-F5344CB8AC3E}">
         <p14:creationId xmlns:p14="http://schemas.microsoft.com/office/powerpoint/2010/main" val="1808467987"/>
       </p:ext>
     </p:extLst>
@@ -10904,7 +11627,7 @@
 </p:sld>
 </file>
 
-<file path=ppt/slides/slide6.xml><?xml version="1.0" encoding="utf-8"?>
+<file path=ppt/slides/slide7.xml><?xml version="1.0" encoding="utf-8"?>
 <p:sld xmlns:a="http://schemas.openxmlformats.org/drawingml/2006/main" xmlns:r="http://schemas.openxmlformats.org/officeDocument/2006/relationships" xmlns:p="http://schemas.openxmlformats.org/presentationml/2006/main">
   <p:cSld>
     <p:spTree>
@@ -11356,7 +12079,7 @@
 </p:sld>
 </file>
 
-<file path=ppt/slides/slide7.xml><?xml version="1.0" encoding="utf-8"?>
+<file path=ppt/slides/slide8.xml><?xml version="1.0" encoding="utf-8"?>
 <p:sld xmlns:a="http://schemas.openxmlformats.org/drawingml/2006/main" xmlns:r="http://schemas.openxmlformats.org/officeDocument/2006/relationships" xmlns:p="http://schemas.openxmlformats.org/presentationml/2006/main">
   <p:cSld>
     <p:spTree>
@@ -11679,7 +12402,7 @@
 </p:sld>
 </file>
 
-<file path=ppt/slides/slide8.xml><?xml version="1.0" encoding="utf-8"?>
+<file path=ppt/slides/slide9.xml><?xml version="1.0" encoding="utf-8"?>
 <p:sld xmlns:a="http://schemas.openxmlformats.org/drawingml/2006/main" xmlns:r="http://schemas.openxmlformats.org/officeDocument/2006/relationships" xmlns:p="http://schemas.openxmlformats.org/presentationml/2006/main">
   <p:cSld>
     <p:spTree>
@@ -11993,513 +12716,6 @@
     <p:extLst>
       <p:ext uri="{BB962C8B-B14F-4D97-AF65-F5344CB8AC3E}">
         <p14:creationId xmlns:p14="http://schemas.microsoft.com/office/powerpoint/2010/main" val="3356930452"/>
-      </p:ext>
-    </p:extLst>
-  </p:cSld>
-  <p:clrMapOvr>
-    <a:masterClrMapping/>
-  </p:clrMapOvr>
-</p:sld>
-</file>
-
-<file path=ppt/slides/slide9.xml><?xml version="1.0" encoding="utf-8"?>
-<p:sld xmlns:a="http://schemas.openxmlformats.org/drawingml/2006/main" xmlns:r="http://schemas.openxmlformats.org/officeDocument/2006/relationships" xmlns:p="http://schemas.openxmlformats.org/presentationml/2006/main">
-  <p:cSld>
-    <p:spTree>
-      <p:nvGrpSpPr>
-        <p:cNvPr id="1" name=""/>
-        <p:cNvGrpSpPr/>
-        <p:nvPr/>
-      </p:nvGrpSpPr>
-      <p:grpSpPr>
-        <a:xfrm>
-          <a:off x="0" y="0"/>
-          <a:ext cx="0" cy="0"/>
-          <a:chOff x="0" y="0"/>
-          <a:chExt cx="0" cy="0"/>
-        </a:xfrm>
-      </p:grpSpPr>
-      <p:sp>
-        <p:nvSpPr>
-          <p:cNvPr id="5" name="Title 1">
-            <a:extLst>
-              <a:ext uri="{FF2B5EF4-FFF2-40B4-BE49-F238E27FC236}">
-                <a16:creationId xmlns:a16="http://schemas.microsoft.com/office/drawing/2014/main" id="{00C4D573-60F6-882F-6BED-51E9C908CC76}"/>
-              </a:ext>
-            </a:extLst>
-          </p:cNvPr>
-          <p:cNvSpPr>
-            <a:spLocks noGrp="1"/>
-          </p:cNvSpPr>
-          <p:nvPr>
-            <p:ph type="title"/>
-          </p:nvPr>
-        </p:nvSpPr>
-        <p:spPr>
-          <a:xfrm>
-            <a:off x="398029" y="103398"/>
-            <a:ext cx="11572297" cy="703263"/>
-          </a:xfrm>
-          <a:solidFill>
-            <a:schemeClr val="accent1">
-              <a:lumMod val="75000"/>
-            </a:schemeClr>
-          </a:solidFill>
-        </p:spPr>
-        <p:txBody>
-          <a:bodyPr>
-            <a:normAutofit/>
-          </a:bodyPr>
-          <a:lstStyle/>
-          <a:p>
-            <a:pPr algn="just"/>
-            <a:r>
-              <a:rPr lang="en-GB" sz="4000" dirty="0"/>
-              <a:t>                  </a:t>
-            </a:r>
-            <a:r>
-              <a:rPr lang="en-GB" sz="2800" dirty="0">
-                <a:solidFill>
-                  <a:schemeClr val="bg2"/>
-                </a:solidFill>
-              </a:rPr>
-              <a:t>Analysis :Bivariate Analysis of Categorical Fields</a:t>
-            </a:r>
-          </a:p>
-        </p:txBody>
-      </p:sp>
-      <p:pic>
-        <p:nvPicPr>
-          <p:cNvPr id="7" name="Picture 6">
-            <a:extLst>
-              <a:ext uri="{FF2B5EF4-FFF2-40B4-BE49-F238E27FC236}">
-                <a16:creationId xmlns:a16="http://schemas.microsoft.com/office/drawing/2014/main" id="{83F5A113-F0D8-A33D-0CD2-E12E3547041E}"/>
-              </a:ext>
-            </a:extLst>
-          </p:cNvPr>
-          <p:cNvPicPr>
-            <a:picLocks noChangeAspect="1"/>
-          </p:cNvPicPr>
-          <p:nvPr/>
-        </p:nvPicPr>
-        <p:blipFill>
-          <a:blip r:embed="rId3"/>
-          <a:stretch>
-            <a:fillRect/>
-          </a:stretch>
-        </p:blipFill>
-        <p:spPr>
-          <a:xfrm>
-            <a:off x="540644" y="240635"/>
-            <a:ext cx="838556" cy="428788"/>
-          </a:xfrm>
-          <a:prstGeom prst="rect">
-            <a:avLst/>
-          </a:prstGeom>
-        </p:spPr>
-      </p:pic>
-      <p:sp>
-        <p:nvSpPr>
-          <p:cNvPr id="8" name="TextBox 7">
-            <a:extLst>
-              <a:ext uri="{FF2B5EF4-FFF2-40B4-BE49-F238E27FC236}">
-                <a16:creationId xmlns:a16="http://schemas.microsoft.com/office/drawing/2014/main" id="{9A75BAFA-1C42-2E14-3759-6472BB60C57C}"/>
-              </a:ext>
-            </a:extLst>
-          </p:cNvPr>
-          <p:cNvSpPr txBox="1"/>
-          <p:nvPr/>
-        </p:nvSpPr>
-        <p:spPr>
-          <a:xfrm>
-            <a:off x="398029" y="806660"/>
-            <a:ext cx="10972800" cy="369332"/>
-          </a:xfrm>
-          <a:prstGeom prst="rect">
-            <a:avLst/>
-          </a:prstGeom>
-          <a:noFill/>
-        </p:spPr>
-        <p:txBody>
-          <a:bodyPr wrap="square" rtlCol="0">
-            <a:spAutoFit/>
-          </a:bodyPr>
-          <a:lstStyle/>
-          <a:p>
-            <a:r>
-              <a:rPr lang="en-GB" b="1" dirty="0" err="1"/>
-              <a:t>OutCome</a:t>
-            </a:r>
-            <a:r>
-              <a:rPr lang="en-GB" b="1" dirty="0"/>
-              <a:t> of Bivariate Analysis for Categorical </a:t>
-            </a:r>
-            <a:r>
-              <a:rPr lang="en-GB" b="1" dirty="0" err="1"/>
-              <a:t>Fileds</a:t>
-            </a:r>
-            <a:endParaRPr lang="en-GB" b="1" dirty="0"/>
-          </a:p>
-        </p:txBody>
-      </p:sp>
-      <p:sp>
-        <p:nvSpPr>
-          <p:cNvPr id="4" name="TextBox 3">
-            <a:extLst>
-              <a:ext uri="{FF2B5EF4-FFF2-40B4-BE49-F238E27FC236}">
-                <a16:creationId xmlns:a16="http://schemas.microsoft.com/office/drawing/2014/main" id="{8B156778-DAE0-2F83-7C3D-A9F2E74D2859}"/>
-              </a:ext>
-            </a:extLst>
-          </p:cNvPr>
-          <p:cNvSpPr txBox="1"/>
-          <p:nvPr/>
-        </p:nvSpPr>
-        <p:spPr>
-          <a:xfrm>
-            <a:off x="540644" y="1488558"/>
-            <a:ext cx="11229598" cy="4801314"/>
-          </a:xfrm>
-          <a:prstGeom prst="rect">
-            <a:avLst/>
-          </a:prstGeom>
-          <a:noFill/>
-        </p:spPr>
-        <p:txBody>
-          <a:bodyPr wrap="square" rtlCol="0">
-            <a:spAutoFit/>
-          </a:bodyPr>
-          <a:lstStyle/>
-          <a:p>
-            <a:pPr algn="l">
-              <a:buFont typeface="Arial" panose="020B0604020202020204" pitchFamily="34" charset="0"/>
-              <a:buChar char="•"/>
-            </a:pPr>
-            <a:r>
-              <a:rPr lang="en-GB" b="0" i="0" dirty="0">
-                <a:effectLst/>
-                <a:highlight>
-                  <a:srgbClr val="FFFFFF"/>
-                </a:highlight>
-                <a:latin typeface="system-ui"/>
-              </a:rPr>
-              <a:t>The following Categorical Variables have a considerable impact on Loan getting Defaulted</a:t>
-            </a:r>
-          </a:p>
-          <a:p>
-            <a:pPr marL="742950" lvl="1" indent="-285750" algn="l">
-              <a:buFont typeface="Arial" panose="020B0604020202020204" pitchFamily="34" charset="0"/>
-              <a:buChar char="•"/>
-            </a:pPr>
-            <a:r>
-              <a:rPr lang="en-GB" b="1" i="0" dirty="0">
-                <a:effectLst/>
-                <a:highlight>
-                  <a:srgbClr val="FFFFFF"/>
-                </a:highlight>
-                <a:latin typeface="system-ui"/>
-              </a:rPr>
-              <a:t>term</a:t>
-            </a:r>
-            <a:r>
-              <a:rPr lang="en-GB" b="0" i="0" dirty="0">
-                <a:effectLst/>
-                <a:highlight>
-                  <a:srgbClr val="FFFFFF"/>
-                </a:highlight>
-                <a:latin typeface="system-ui"/>
-              </a:rPr>
-              <a:t> , Higher Term like 60 months are at a higher risk of getting defaulted</a:t>
-            </a:r>
-          </a:p>
-          <a:p>
-            <a:pPr marL="742950" lvl="1" indent="-285750" algn="l">
-              <a:buFont typeface="Arial" panose="020B0604020202020204" pitchFamily="34" charset="0"/>
-              <a:buChar char="•"/>
-            </a:pPr>
-            <a:r>
-              <a:rPr lang="en-GB" b="1" i="0" dirty="0">
-                <a:effectLst/>
-                <a:highlight>
-                  <a:srgbClr val="FFFFFF"/>
-                </a:highlight>
-                <a:latin typeface="system-ui"/>
-              </a:rPr>
-              <a:t>grade and </a:t>
-            </a:r>
-            <a:r>
-              <a:rPr lang="en-GB" b="1" i="0" dirty="0" err="1">
-                <a:effectLst/>
-                <a:highlight>
-                  <a:srgbClr val="FFFFFF"/>
-                </a:highlight>
-                <a:latin typeface="system-ui"/>
-              </a:rPr>
-              <a:t>sub_grade</a:t>
-            </a:r>
-            <a:r>
-              <a:rPr lang="en-GB" b="0" i="0" dirty="0">
-                <a:effectLst/>
-                <a:highlight>
-                  <a:srgbClr val="FFFFFF"/>
-                </a:highlight>
-                <a:latin typeface="system-ui"/>
-              </a:rPr>
-              <a:t> , lower the grade then higher is the risk of getting defaulted</a:t>
-            </a:r>
-          </a:p>
-          <a:p>
-            <a:pPr marL="742950" lvl="1" indent="-285750" algn="l">
-              <a:buFont typeface="Arial" panose="020B0604020202020204" pitchFamily="34" charset="0"/>
-              <a:buChar char="•"/>
-            </a:pPr>
-            <a:r>
-              <a:rPr lang="en-GB" b="1" i="0" dirty="0">
-                <a:effectLst/>
-                <a:highlight>
-                  <a:srgbClr val="FFFFFF"/>
-                </a:highlight>
-                <a:latin typeface="system-ui"/>
-              </a:rPr>
-              <a:t>purpose</a:t>
-            </a:r>
-            <a:r>
-              <a:rPr lang="en-GB" b="0" i="0" dirty="0">
-                <a:effectLst/>
-                <a:highlight>
-                  <a:srgbClr val="FFFFFF"/>
-                </a:highlight>
-                <a:latin typeface="system-ui"/>
-              </a:rPr>
-              <a:t> , the purpose named </a:t>
-            </a:r>
-            <a:r>
-              <a:rPr lang="en-GB" b="1" i="0" dirty="0">
-                <a:effectLst/>
-                <a:highlight>
-                  <a:srgbClr val="FFFFFF"/>
-                </a:highlight>
-                <a:latin typeface="system-ui"/>
-              </a:rPr>
-              <a:t>“small business” </a:t>
-            </a:r>
-            <a:r>
-              <a:rPr lang="en-GB" b="0" i="0" dirty="0">
-                <a:effectLst/>
-                <a:highlight>
-                  <a:srgbClr val="FFFFFF"/>
-                </a:highlight>
-                <a:latin typeface="system-ui"/>
-              </a:rPr>
-              <a:t>has a higher probability of getting defaulted in comparison to other purposes</a:t>
-            </a:r>
-          </a:p>
-          <a:p>
-            <a:pPr marL="742950" lvl="1" indent="-285750" algn="l">
-              <a:buFont typeface="Arial" panose="020B0604020202020204" pitchFamily="34" charset="0"/>
-              <a:buChar char="•"/>
-            </a:pPr>
-            <a:r>
-              <a:rPr lang="en-GB" b="1" i="0" dirty="0" err="1">
-                <a:effectLst/>
-                <a:highlight>
-                  <a:srgbClr val="FFFFFF"/>
-                </a:highlight>
-                <a:latin typeface="system-ui"/>
-              </a:rPr>
-              <a:t>addr_state</a:t>
-            </a:r>
-            <a:r>
-              <a:rPr lang="en-GB" b="0" i="0" dirty="0">
-                <a:effectLst/>
-                <a:highlight>
-                  <a:srgbClr val="FFFFFF"/>
-                </a:highlight>
-                <a:latin typeface="system-ui"/>
-              </a:rPr>
-              <a:t> , the state 'NE' has a higher probability of getting defaulted though the count of samples considered are very less</a:t>
-            </a:r>
-          </a:p>
-          <a:p>
-            <a:pPr marL="742950" lvl="1" indent="-285750" algn="l">
-              <a:buFont typeface="Arial" panose="020B0604020202020204" pitchFamily="34" charset="0"/>
-              <a:buChar char="•"/>
-            </a:pPr>
-            <a:r>
-              <a:rPr lang="en-GB" b="1" i="0" dirty="0" err="1">
-                <a:effectLst/>
-                <a:highlight>
-                  <a:srgbClr val="FFFFFF"/>
-                </a:highlight>
-                <a:latin typeface="system-ui"/>
-              </a:rPr>
-              <a:t>pub_rec_bankruptcies</a:t>
-            </a:r>
-            <a:r>
-              <a:rPr lang="en-GB" b="0" i="0" dirty="0">
-                <a:effectLst/>
-                <a:highlight>
-                  <a:srgbClr val="FFFFFF"/>
-                </a:highlight>
-                <a:latin typeface="system-ui"/>
-              </a:rPr>
-              <a:t>, higher the number of publicly recorded bankruptcies relates to higher risk of getting Defaulted</a:t>
-            </a:r>
-            <a:br>
-              <a:rPr lang="en-GB" b="0" i="0" dirty="0">
-                <a:effectLst/>
-                <a:highlight>
-                  <a:srgbClr val="FFFFFF"/>
-                </a:highlight>
-                <a:latin typeface="system-ui"/>
-              </a:rPr>
-            </a:br>
-            <a:endParaRPr lang="en-GB" b="0" i="0" dirty="0">
-              <a:effectLst/>
-              <a:highlight>
-                <a:srgbClr val="FFFFFF"/>
-              </a:highlight>
-              <a:latin typeface="system-ui"/>
-            </a:endParaRPr>
-          </a:p>
-          <a:p>
-            <a:pPr algn="l">
-              <a:buFont typeface="Arial" panose="020B0604020202020204" pitchFamily="34" charset="0"/>
-              <a:buChar char="•"/>
-            </a:pPr>
-            <a:r>
-              <a:rPr lang="en-GB" b="0" i="0" dirty="0">
-                <a:effectLst/>
-                <a:highlight>
-                  <a:srgbClr val="FFFFFF"/>
-                </a:highlight>
-                <a:latin typeface="system-ui"/>
-              </a:rPr>
-              <a:t>The following Categorical Variables do not have a significant or prominent impact on Loan getting Defaulted</a:t>
-            </a:r>
-          </a:p>
-          <a:p>
-            <a:pPr marL="742950" lvl="1" indent="-285750" algn="l">
-              <a:buFont typeface="Arial" panose="020B0604020202020204" pitchFamily="34" charset="0"/>
-              <a:buChar char="•"/>
-            </a:pPr>
-            <a:r>
-              <a:rPr lang="en-GB" b="1" i="0" dirty="0" err="1">
-                <a:effectLst/>
-                <a:highlight>
-                  <a:srgbClr val="FFFFFF"/>
-                </a:highlight>
-                <a:latin typeface="system-ui"/>
-              </a:rPr>
-              <a:t>emp_length</a:t>
-            </a:r>
-            <a:endParaRPr lang="en-GB" b="0" i="0" dirty="0">
-              <a:effectLst/>
-              <a:highlight>
-                <a:srgbClr val="FFFFFF"/>
-              </a:highlight>
-              <a:latin typeface="system-ui"/>
-            </a:endParaRPr>
-          </a:p>
-          <a:p>
-            <a:pPr marL="742950" lvl="1" indent="-285750" algn="l">
-              <a:buFont typeface="Arial" panose="020B0604020202020204" pitchFamily="34" charset="0"/>
-              <a:buChar char="•"/>
-            </a:pPr>
-            <a:r>
-              <a:rPr lang="en-GB" b="1" i="0" dirty="0" err="1">
-                <a:effectLst/>
-                <a:highlight>
-                  <a:srgbClr val="FFFFFF"/>
-                </a:highlight>
-                <a:latin typeface="system-ui"/>
-              </a:rPr>
-              <a:t>home_ownership</a:t>
-            </a:r>
-            <a:endParaRPr lang="en-GB" b="0" i="0" dirty="0">
-              <a:effectLst/>
-              <a:highlight>
-                <a:srgbClr val="FFFFFF"/>
-              </a:highlight>
-              <a:latin typeface="system-ui"/>
-            </a:endParaRPr>
-          </a:p>
-          <a:p>
-            <a:pPr marL="742950" lvl="1" indent="-285750" algn="l">
-              <a:buFont typeface="Arial" panose="020B0604020202020204" pitchFamily="34" charset="0"/>
-              <a:buChar char="•"/>
-            </a:pPr>
-            <a:r>
-              <a:rPr lang="en-GB" b="1" i="0" dirty="0" err="1">
-                <a:effectLst/>
-                <a:highlight>
-                  <a:srgbClr val="FFFFFF"/>
-                </a:highlight>
-                <a:latin typeface="system-ui"/>
-              </a:rPr>
-              <a:t>verification_status</a:t>
-            </a:r>
-            <a:endParaRPr lang="en-GB" b="0" i="0" dirty="0">
-              <a:effectLst/>
-              <a:highlight>
-                <a:srgbClr val="FFFFFF"/>
-              </a:highlight>
-              <a:latin typeface="system-ui"/>
-            </a:endParaRPr>
-          </a:p>
-          <a:p>
-            <a:pPr marL="742950" lvl="1" indent="-285750" algn="l">
-              <a:buFont typeface="Arial" panose="020B0604020202020204" pitchFamily="34" charset="0"/>
-              <a:buChar char="•"/>
-            </a:pPr>
-            <a:r>
-              <a:rPr lang="en-GB" b="1" i="0" dirty="0" err="1">
-                <a:effectLst/>
-                <a:highlight>
-                  <a:srgbClr val="FFFFFF"/>
-                </a:highlight>
-                <a:latin typeface="system-ui"/>
-              </a:rPr>
-              <a:t>pub_rec</a:t>
-            </a:r>
-            <a:endParaRPr lang="en-GB" b="1" i="0" dirty="0">
-              <a:effectLst/>
-              <a:highlight>
-                <a:srgbClr val="FFFFFF"/>
-              </a:highlight>
-              <a:latin typeface="system-ui"/>
-            </a:endParaRPr>
-          </a:p>
-          <a:p>
-            <a:pPr marL="742950" lvl="1" indent="-285750" algn="l">
-              <a:buFont typeface="Arial" panose="020B0604020202020204" pitchFamily="34" charset="0"/>
-              <a:buChar char="•"/>
-            </a:pPr>
-            <a:r>
-              <a:rPr lang="en-GB" b="1" dirty="0" err="1">
-                <a:highlight>
-                  <a:srgbClr val="FFFFFF"/>
-                </a:highlight>
-                <a:latin typeface="system-ui"/>
-              </a:rPr>
-              <a:t>issue_d</a:t>
-            </a:r>
-            <a:endParaRPr lang="en-GB" b="0" i="0" dirty="0">
-              <a:effectLst/>
-              <a:highlight>
-                <a:srgbClr val="FFFFFF"/>
-              </a:highlight>
-              <a:latin typeface="system-ui"/>
-            </a:endParaRPr>
-          </a:p>
-          <a:p>
-            <a:endParaRPr lang="en-GB" dirty="0"/>
-          </a:p>
-        </p:txBody>
-      </p:sp>
-    </p:spTree>
-    <p:extLst>
-      <p:ext uri="{BB962C8B-B14F-4D97-AF65-F5344CB8AC3E}">
-        <p14:creationId xmlns:p14="http://schemas.microsoft.com/office/powerpoint/2010/main" val="975904479"/>
       </p:ext>
     </p:extLst>
   </p:cSld>

</xml_diff>

<commit_message>
Attached Column Descriptions for the Columns used in Analysis
</commit_message>
<xml_diff>
--- a/LendingClubCaseStudy.pptx
+++ b/LendingClubCaseStudy.pptx
@@ -5,20 +5,21 @@
     <p:sldMasterId id="2147483648" r:id="rId1"/>
   </p:sldMasterIdLst>
   <p:notesMasterIdLst>
-    <p:notesMasterId r:id="rId13"/>
+    <p:notesMasterId r:id="rId14"/>
   </p:notesMasterIdLst>
   <p:sldIdLst>
     <p:sldId id="257" r:id="rId2"/>
     <p:sldId id="258" r:id="rId3"/>
     <p:sldId id="262" r:id="rId4"/>
     <p:sldId id="259" r:id="rId5"/>
-    <p:sldId id="272" r:id="rId6"/>
-    <p:sldId id="267" r:id="rId7"/>
-    <p:sldId id="268" r:id="rId8"/>
-    <p:sldId id="269" r:id="rId9"/>
-    <p:sldId id="266" r:id="rId10"/>
-    <p:sldId id="270" r:id="rId11"/>
-    <p:sldId id="264" r:id="rId12"/>
+    <p:sldId id="273" r:id="rId6"/>
+    <p:sldId id="272" r:id="rId7"/>
+    <p:sldId id="267" r:id="rId8"/>
+    <p:sldId id="268" r:id="rId9"/>
+    <p:sldId id="269" r:id="rId10"/>
+    <p:sldId id="266" r:id="rId11"/>
+    <p:sldId id="270" r:id="rId12"/>
+    <p:sldId id="264" r:id="rId13"/>
   </p:sldIdLst>
   <p:sldSz cx="12192000" cy="6858000"/>
   <p:notesSz cx="6858000" cy="9144000"/>
@@ -3476,7 +3477,7 @@
           <a:p>
             <a:fld id="{24975932-DF6A-4632-8349-D8F7046C48F4}" type="slidenum">
               <a:rPr lang="en-GB" smtClean="0"/>
-              <a:t>8</a:t>
+              <a:t>9</a:t>
             </a:fld>
             <a:endParaRPr lang="en-GB"/>
           </a:p>
@@ -3560,7 +3561,7 @@
           <a:p>
             <a:fld id="{24975932-DF6A-4632-8349-D8F7046C48F4}" type="slidenum">
               <a:rPr lang="en-GB" smtClean="0"/>
-              <a:t>9</a:t>
+              <a:t>10</a:t>
             </a:fld>
             <a:endParaRPr lang="en-GB"/>
           </a:p>
@@ -3644,7 +3645,7 @@
           <a:p>
             <a:fld id="{24975932-DF6A-4632-8349-D8F7046C48F4}" type="slidenum">
               <a:rPr lang="en-GB" smtClean="0"/>
-              <a:t>10</a:t>
+              <a:t>11</a:t>
             </a:fld>
             <a:endParaRPr lang="en-GB"/>
           </a:p>
@@ -7971,6 +7972,329 @@
           <a:lstStyle/>
           <a:p>
             <a:r>
+              <a:rPr lang="en-GB" b="1" dirty="0"/>
+              <a:t>Bivariate analysis indicating  following fields do not have a considerable impact on loan status</a:t>
+            </a:r>
+          </a:p>
+        </p:txBody>
+      </p:sp>
+      <p:pic>
+        <p:nvPicPr>
+          <p:cNvPr id="31" name="Content Placeholder 30">
+            <a:extLst>
+              <a:ext uri="{FF2B5EF4-FFF2-40B4-BE49-F238E27FC236}">
+                <a16:creationId xmlns:a16="http://schemas.microsoft.com/office/drawing/2014/main" id="{F5670231-FCA1-9E21-2CBA-27DEC4957ED1}"/>
+              </a:ext>
+            </a:extLst>
+          </p:cNvPr>
+          <p:cNvPicPr>
+            <a:picLocks noGrp="1" noChangeAspect="1"/>
+          </p:cNvPicPr>
+          <p:nvPr>
+            <p:ph idx="1"/>
+          </p:nvPr>
+        </p:nvPicPr>
+        <p:blipFill>
+          <a:blip r:embed="rId4"/>
+          <a:stretch>
+            <a:fillRect/>
+          </a:stretch>
+        </p:blipFill>
+        <p:spPr>
+          <a:xfrm>
+            <a:off x="0" y="1214094"/>
+            <a:ext cx="4601459" cy="2482978"/>
+          </a:xfrm>
+        </p:spPr>
+      </p:pic>
+      <p:pic>
+        <p:nvPicPr>
+          <p:cNvPr id="33" name="Picture 32">
+            <a:extLst>
+              <a:ext uri="{FF2B5EF4-FFF2-40B4-BE49-F238E27FC236}">
+                <a16:creationId xmlns:a16="http://schemas.microsoft.com/office/drawing/2014/main" id="{CFB2EAAF-053B-6A24-3D65-6E30E056B964}"/>
+              </a:ext>
+            </a:extLst>
+          </p:cNvPr>
+          <p:cNvPicPr>
+            <a:picLocks noChangeAspect="1"/>
+          </p:cNvPicPr>
+          <p:nvPr/>
+        </p:nvPicPr>
+        <p:blipFill>
+          <a:blip r:embed="rId5"/>
+          <a:stretch>
+            <a:fillRect/>
+          </a:stretch>
+        </p:blipFill>
+        <p:spPr>
+          <a:xfrm>
+            <a:off x="4708337" y="1313495"/>
+            <a:ext cx="3904035" cy="2284175"/>
+          </a:xfrm>
+          <a:prstGeom prst="rect">
+            <a:avLst/>
+          </a:prstGeom>
+        </p:spPr>
+      </p:pic>
+      <p:pic>
+        <p:nvPicPr>
+          <p:cNvPr id="35" name="Picture 34">
+            <a:extLst>
+              <a:ext uri="{FF2B5EF4-FFF2-40B4-BE49-F238E27FC236}">
+                <a16:creationId xmlns:a16="http://schemas.microsoft.com/office/drawing/2014/main" id="{799FE78C-567C-5A21-7A4F-F8AC571AE850}"/>
+              </a:ext>
+            </a:extLst>
+          </p:cNvPr>
+          <p:cNvPicPr>
+            <a:picLocks noChangeAspect="1"/>
+          </p:cNvPicPr>
+          <p:nvPr/>
+        </p:nvPicPr>
+        <p:blipFill>
+          <a:blip r:embed="rId6"/>
+          <a:stretch>
+            <a:fillRect/>
+          </a:stretch>
+        </p:blipFill>
+        <p:spPr>
+          <a:xfrm>
+            <a:off x="0" y="4104505"/>
+            <a:ext cx="4601459" cy="2635385"/>
+          </a:xfrm>
+          <a:prstGeom prst="rect">
+            <a:avLst/>
+          </a:prstGeom>
+        </p:spPr>
+      </p:pic>
+      <p:pic>
+        <p:nvPicPr>
+          <p:cNvPr id="37" name="Picture 36">
+            <a:extLst>
+              <a:ext uri="{FF2B5EF4-FFF2-40B4-BE49-F238E27FC236}">
+                <a16:creationId xmlns:a16="http://schemas.microsoft.com/office/drawing/2014/main" id="{5ADA374A-0A25-975C-E9AE-1285C919E9D9}"/>
+              </a:ext>
+            </a:extLst>
+          </p:cNvPr>
+          <p:cNvPicPr>
+            <a:picLocks noChangeAspect="1"/>
+          </p:cNvPicPr>
+          <p:nvPr/>
+        </p:nvPicPr>
+        <p:blipFill>
+          <a:blip r:embed="rId7"/>
+          <a:stretch>
+            <a:fillRect/>
+          </a:stretch>
+        </p:blipFill>
+        <p:spPr>
+          <a:xfrm>
+            <a:off x="4708337" y="4104505"/>
+            <a:ext cx="3904035" cy="2654436"/>
+          </a:xfrm>
+          <a:prstGeom prst="rect">
+            <a:avLst/>
+          </a:prstGeom>
+        </p:spPr>
+      </p:pic>
+      <p:pic>
+        <p:nvPicPr>
+          <p:cNvPr id="39" name="Picture 38">
+            <a:extLst>
+              <a:ext uri="{FF2B5EF4-FFF2-40B4-BE49-F238E27FC236}">
+                <a16:creationId xmlns:a16="http://schemas.microsoft.com/office/drawing/2014/main" id="{2A1024A1-F00F-7E75-6F91-CBF35082E68B}"/>
+              </a:ext>
+            </a:extLst>
+          </p:cNvPr>
+          <p:cNvPicPr>
+            <a:picLocks noChangeAspect="1"/>
+          </p:cNvPicPr>
+          <p:nvPr/>
+        </p:nvPicPr>
+        <p:blipFill>
+          <a:blip r:embed="rId8"/>
+          <a:stretch>
+            <a:fillRect/>
+          </a:stretch>
+        </p:blipFill>
+        <p:spPr>
+          <a:xfrm>
+            <a:off x="8856921" y="4029741"/>
+            <a:ext cx="3335079" cy="2774246"/>
+          </a:xfrm>
+          <a:prstGeom prst="rect">
+            <a:avLst/>
+          </a:prstGeom>
+        </p:spPr>
+      </p:pic>
+      <p:pic>
+        <p:nvPicPr>
+          <p:cNvPr id="41" name="Picture 40">
+            <a:extLst>
+              <a:ext uri="{FF2B5EF4-FFF2-40B4-BE49-F238E27FC236}">
+                <a16:creationId xmlns:a16="http://schemas.microsoft.com/office/drawing/2014/main" id="{4876E4AA-1109-7762-452E-AA2219EE62EB}"/>
+              </a:ext>
+            </a:extLst>
+          </p:cNvPr>
+          <p:cNvPicPr>
+            <a:picLocks noChangeAspect="1"/>
+          </p:cNvPicPr>
+          <p:nvPr/>
+        </p:nvPicPr>
+        <p:blipFill>
+          <a:blip r:embed="rId9"/>
+          <a:stretch>
+            <a:fillRect/>
+          </a:stretch>
+        </p:blipFill>
+        <p:spPr>
+          <a:xfrm>
+            <a:off x="8856921" y="1291018"/>
+            <a:ext cx="3113405" cy="2254366"/>
+          </a:xfrm>
+          <a:prstGeom prst="rect">
+            <a:avLst/>
+          </a:prstGeom>
+        </p:spPr>
+      </p:pic>
+    </p:spTree>
+    <p:extLst>
+      <p:ext uri="{BB962C8B-B14F-4D97-AF65-F5344CB8AC3E}">
+        <p14:creationId xmlns:p14="http://schemas.microsoft.com/office/powerpoint/2010/main" val="3356930452"/>
+      </p:ext>
+    </p:extLst>
+  </p:cSld>
+  <p:clrMapOvr>
+    <a:masterClrMapping/>
+  </p:clrMapOvr>
+</p:sld>
+</file>
+
+<file path=ppt/slides/slide11.xml><?xml version="1.0" encoding="utf-8"?>
+<p:sld xmlns:a="http://schemas.openxmlformats.org/drawingml/2006/main" xmlns:r="http://schemas.openxmlformats.org/officeDocument/2006/relationships" xmlns:p="http://schemas.openxmlformats.org/presentationml/2006/main">
+  <p:cSld>
+    <p:spTree>
+      <p:nvGrpSpPr>
+        <p:cNvPr id="1" name=""/>
+        <p:cNvGrpSpPr/>
+        <p:nvPr/>
+      </p:nvGrpSpPr>
+      <p:grpSpPr>
+        <a:xfrm>
+          <a:off x="0" y="0"/>
+          <a:ext cx="0" cy="0"/>
+          <a:chOff x="0" y="0"/>
+          <a:chExt cx="0" cy="0"/>
+        </a:xfrm>
+      </p:grpSpPr>
+      <p:sp>
+        <p:nvSpPr>
+          <p:cNvPr id="5" name="Title 1">
+            <a:extLst>
+              <a:ext uri="{FF2B5EF4-FFF2-40B4-BE49-F238E27FC236}">
+                <a16:creationId xmlns:a16="http://schemas.microsoft.com/office/drawing/2014/main" id="{00C4D573-60F6-882F-6BED-51E9C908CC76}"/>
+              </a:ext>
+            </a:extLst>
+          </p:cNvPr>
+          <p:cNvSpPr>
+            <a:spLocks noGrp="1"/>
+          </p:cNvSpPr>
+          <p:nvPr>
+            <p:ph type="title"/>
+          </p:nvPr>
+        </p:nvSpPr>
+        <p:spPr>
+          <a:xfrm>
+            <a:off x="398029" y="103398"/>
+            <a:ext cx="11572297" cy="703263"/>
+          </a:xfrm>
+          <a:solidFill>
+            <a:schemeClr val="accent1">
+              <a:lumMod val="75000"/>
+            </a:schemeClr>
+          </a:solidFill>
+        </p:spPr>
+        <p:txBody>
+          <a:bodyPr>
+            <a:normAutofit/>
+          </a:bodyPr>
+          <a:lstStyle/>
+          <a:p>
+            <a:pPr algn="just"/>
+            <a:r>
+              <a:rPr lang="en-GB" sz="4000" dirty="0"/>
+              <a:t>                  </a:t>
+            </a:r>
+            <a:r>
+              <a:rPr lang="en-GB" sz="2800" dirty="0">
+                <a:solidFill>
+                  <a:schemeClr val="bg2"/>
+                </a:solidFill>
+              </a:rPr>
+              <a:t>Analysis :Bivariate Analysis of Categorical Fields</a:t>
+            </a:r>
+          </a:p>
+        </p:txBody>
+      </p:sp>
+      <p:pic>
+        <p:nvPicPr>
+          <p:cNvPr id="7" name="Picture 6">
+            <a:extLst>
+              <a:ext uri="{FF2B5EF4-FFF2-40B4-BE49-F238E27FC236}">
+                <a16:creationId xmlns:a16="http://schemas.microsoft.com/office/drawing/2014/main" id="{83F5A113-F0D8-A33D-0CD2-E12E3547041E}"/>
+              </a:ext>
+            </a:extLst>
+          </p:cNvPr>
+          <p:cNvPicPr>
+            <a:picLocks noChangeAspect="1"/>
+          </p:cNvPicPr>
+          <p:nvPr/>
+        </p:nvPicPr>
+        <p:blipFill>
+          <a:blip r:embed="rId3"/>
+          <a:stretch>
+            <a:fillRect/>
+          </a:stretch>
+        </p:blipFill>
+        <p:spPr>
+          <a:xfrm>
+            <a:off x="540644" y="240635"/>
+            <a:ext cx="838556" cy="428788"/>
+          </a:xfrm>
+          <a:prstGeom prst="rect">
+            <a:avLst/>
+          </a:prstGeom>
+        </p:spPr>
+      </p:pic>
+      <p:sp>
+        <p:nvSpPr>
+          <p:cNvPr id="8" name="TextBox 7">
+            <a:extLst>
+              <a:ext uri="{FF2B5EF4-FFF2-40B4-BE49-F238E27FC236}">
+                <a16:creationId xmlns:a16="http://schemas.microsoft.com/office/drawing/2014/main" id="{9A75BAFA-1C42-2E14-3759-6472BB60C57C}"/>
+              </a:ext>
+            </a:extLst>
+          </p:cNvPr>
+          <p:cNvSpPr txBox="1"/>
+          <p:nvPr/>
+        </p:nvSpPr>
+        <p:spPr>
+          <a:xfrm>
+            <a:off x="398029" y="806660"/>
+            <a:ext cx="10972800" cy="369332"/>
+          </a:xfrm>
+          <a:prstGeom prst="rect">
+            <a:avLst/>
+          </a:prstGeom>
+          <a:noFill/>
+        </p:spPr>
+        <p:txBody>
+          <a:bodyPr wrap="square" rtlCol="0">
+            <a:spAutoFit/>
+          </a:bodyPr>
+          <a:lstStyle/>
+          <a:p>
+            <a:r>
               <a:rPr lang="en-GB" b="1" dirty="0" err="1"/>
               <a:t>OutCome</a:t>
             </a:r>
@@ -8353,7 +8677,7 @@
 </p:sld>
 </file>
 
-<file path=ppt/slides/slide11.xml><?xml version="1.0" encoding="utf-8"?>
+<file path=ppt/slides/slide12.xml><?xml version="1.0" encoding="utf-8"?>
 <p:sld xmlns:a="http://schemas.openxmlformats.org/drawingml/2006/main" xmlns:r="http://schemas.openxmlformats.org/officeDocument/2006/relationships" xmlns:p="http://schemas.openxmlformats.org/presentationml/2006/main">
   <p:cSld>
     <p:spTree>
@@ -10737,6 +11061,17 @@
               <a:buChar char="•"/>
             </a:pPr>
             <a:r>
+              <a:rPr lang="en-GB" dirty="0" err="1"/>
+              <a:t>dti</a:t>
+            </a:r>
+            <a:endParaRPr lang="en-GB" dirty="0"/>
+          </a:p>
+          <a:p>
+            <a:pPr marL="285750" indent="-285750">
+              <a:buFont typeface="Arial" panose="020B0604020202020204" pitchFamily="34" charset="0"/>
+              <a:buChar char="•"/>
+            </a:pPr>
+            <a:r>
               <a:rPr lang="en-GB" dirty="0"/>
               <a:t>delinq_2yrs</a:t>
             </a:r>
@@ -10967,6 +11302,1325 @@
 </file>
 
 <file path=ppt/slides/slide5.xml><?xml version="1.0" encoding="utf-8"?>
+<p:sld xmlns:a="http://schemas.openxmlformats.org/drawingml/2006/main" xmlns:r="http://schemas.openxmlformats.org/officeDocument/2006/relationships" xmlns:p="http://schemas.openxmlformats.org/presentationml/2006/main">
+  <p:cSld>
+    <p:bg>
+      <p:bgPr>
+        <a:solidFill>
+          <a:schemeClr val="bg1"/>
+        </a:solidFill>
+        <a:effectLst/>
+      </p:bgPr>
+    </p:bg>
+    <p:spTree>
+      <p:nvGrpSpPr>
+        <p:cNvPr id="1" name=""/>
+        <p:cNvGrpSpPr/>
+        <p:nvPr/>
+      </p:nvGrpSpPr>
+      <p:grpSpPr>
+        <a:xfrm>
+          <a:off x="0" y="0"/>
+          <a:ext cx="0" cy="0"/>
+          <a:chOff x="0" y="0"/>
+          <a:chExt cx="0" cy="0"/>
+        </a:xfrm>
+      </p:grpSpPr>
+      <p:sp useBgFill="1">
+        <p:nvSpPr>
+          <p:cNvPr id="17" name="Rectangle 16">
+            <a:extLst>
+              <a:ext uri="{FF2B5EF4-FFF2-40B4-BE49-F238E27FC236}">
+                <a16:creationId xmlns:a16="http://schemas.microsoft.com/office/drawing/2014/main" id="{1B15ED52-F352-441B-82BF-E0EA34836D08}"/>
+              </a:ext>
+              <a:ext uri="{C183D7F6-B498-43B3-948B-1728B52AA6E4}">
+                <adec:decorative xmlns:adec="http://schemas.microsoft.com/office/drawing/2017/decorative" val="1"/>
+              </a:ext>
+            </a:extLst>
+          </p:cNvPr>
+          <p:cNvSpPr>
+            <a:spLocks noGrp="1" noRot="1" noChangeAspect="1" noMove="1" noResize="1" noEditPoints="1" noAdjustHandles="1" noChangeArrowheads="1" noChangeShapeType="1" noTextEdit="1"/>
+          </p:cNvSpPr>
+          <p:nvPr>
+            <p:extLst>
+              <p:ext uri="{386F3935-93C4-4BCD-93E2-E3B085C9AB24}">
+                <p16:designElem xmlns:p16="http://schemas.microsoft.com/office/powerpoint/2015/main" val="1"/>
+              </p:ext>
+            </p:extLst>
+          </p:nvPr>
+        </p:nvSpPr>
+        <p:spPr>
+          <a:xfrm>
+            <a:off x="0" y="0"/>
+            <a:ext cx="12192000" cy="6858000"/>
+          </a:xfrm>
+          <a:prstGeom prst="rect">
+            <a:avLst/>
+          </a:prstGeom>
+          <a:ln w="12700" cap="flat" cmpd="sng" algn="ctr">
+            <a:noFill/>
+            <a:prstDash val="solid"/>
+            <a:miter lim="800000"/>
+          </a:ln>
+          <a:effectLst/>
+          <a:extLst>
+            <a:ext uri="{91240B29-F687-4F45-9708-019B960494DF}">
+              <a14:hiddenLine xmlns:a14="http://schemas.microsoft.com/office/drawing/2010/main" w="12700" cap="flat" cmpd="sng" algn="ctr">
+                <a:solidFill>
+                  <a:schemeClr val="accent1">
+                    <a:shade val="50000"/>
+                  </a:schemeClr>
+                </a:solidFill>
+                <a:prstDash val="solid"/>
+                <a:miter lim="800000"/>
+              </a14:hiddenLine>
+            </a:ext>
+          </a:extLst>
+        </p:spPr>
+        <p:style>
+          <a:lnRef idx="2">
+            <a:schemeClr val="accent1">
+              <a:shade val="50000"/>
+            </a:schemeClr>
+          </a:lnRef>
+          <a:fillRef idx="1">
+            <a:schemeClr val="accent1"/>
+          </a:fillRef>
+          <a:effectRef idx="0">
+            <a:schemeClr val="accent1"/>
+          </a:effectRef>
+          <a:fontRef idx="minor">
+            <a:schemeClr val="lt1"/>
+          </a:fontRef>
+        </p:style>
+        <p:txBody>
+          <a:bodyPr rtlCol="0" anchor="ctr"/>
+          <a:lstStyle/>
+          <a:p>
+            <a:pPr algn="ctr"/>
+            <a:endParaRPr lang="en-US"/>
+          </a:p>
+        </p:txBody>
+      </p:sp>
+      <p:sp>
+        <p:nvSpPr>
+          <p:cNvPr id="19" name="Rectangle 18">
+            <a:extLst>
+              <a:ext uri="{FF2B5EF4-FFF2-40B4-BE49-F238E27FC236}">
+                <a16:creationId xmlns:a16="http://schemas.microsoft.com/office/drawing/2014/main" id="{3B2E3793-BFE6-45A2-9B7B-E18844431C99}"/>
+              </a:ext>
+              <a:ext uri="{C183D7F6-B498-43B3-948B-1728B52AA6E4}">
+                <adec:decorative xmlns:adec="http://schemas.microsoft.com/office/drawing/2017/decorative" val="1"/>
+              </a:ext>
+            </a:extLst>
+          </p:cNvPr>
+          <p:cNvSpPr>
+            <a:spLocks noGrp="1" noRot="1" noChangeAspect="1" noMove="1" noResize="1" noEditPoints="1" noAdjustHandles="1" noChangeArrowheads="1" noChangeShapeType="1" noTextEdit="1"/>
+          </p:cNvSpPr>
+          <p:nvPr>
+            <p:extLst>
+              <p:ext uri="{386F3935-93C4-4BCD-93E2-E3B085C9AB24}">
+                <p16:designElem xmlns:p16="http://schemas.microsoft.com/office/powerpoint/2015/main" val="1"/>
+              </p:ext>
+            </p:extLst>
+          </p:nvPr>
+        </p:nvSpPr>
+        <p:spPr>
+          <a:xfrm flipH="1">
+            <a:off x="-1" y="-1"/>
+            <a:ext cx="12191998" cy="1590742"/>
+          </a:xfrm>
+          <a:prstGeom prst="rect">
+            <a:avLst/>
+          </a:prstGeom>
+          <a:gradFill>
+            <a:gsLst>
+              <a:gs pos="0">
+                <a:srgbClr val="000000"/>
+              </a:gs>
+              <a:gs pos="100000">
+                <a:schemeClr val="accent1">
+                  <a:lumMod val="75000"/>
+                </a:schemeClr>
+              </a:gs>
+            </a:gsLst>
+            <a:lin ang="8400000" scaled="0"/>
+          </a:gradFill>
+          <a:ln>
+            <a:noFill/>
+          </a:ln>
+        </p:spPr>
+        <p:style>
+          <a:lnRef idx="2">
+            <a:schemeClr val="accent1">
+              <a:shade val="50000"/>
+            </a:schemeClr>
+          </a:lnRef>
+          <a:fillRef idx="1">
+            <a:schemeClr val="accent1"/>
+          </a:fillRef>
+          <a:effectRef idx="0">
+            <a:schemeClr val="accent1"/>
+          </a:effectRef>
+          <a:fontRef idx="minor">
+            <a:schemeClr val="lt1"/>
+          </a:fontRef>
+        </p:style>
+        <p:txBody>
+          <a:bodyPr rtlCol="0" anchor="ctr"/>
+          <a:lstStyle/>
+          <a:p>
+            <a:pPr algn="ctr"/>
+            <a:endParaRPr lang="en-US"/>
+          </a:p>
+        </p:txBody>
+      </p:sp>
+      <p:sp>
+        <p:nvSpPr>
+          <p:cNvPr id="20" name="Rectangle 19">
+            <a:extLst>
+              <a:ext uri="{FF2B5EF4-FFF2-40B4-BE49-F238E27FC236}">
+                <a16:creationId xmlns:a16="http://schemas.microsoft.com/office/drawing/2014/main" id="{BC4C4868-CB8F-4AF9-9CDB-8108F2C19B67}"/>
+              </a:ext>
+              <a:ext uri="{C183D7F6-B498-43B3-948B-1728B52AA6E4}">
+                <adec:decorative xmlns:adec="http://schemas.microsoft.com/office/drawing/2017/decorative" val="1"/>
+              </a:ext>
+            </a:extLst>
+          </p:cNvPr>
+          <p:cNvSpPr>
+            <a:spLocks noGrp="1" noRot="1" noChangeAspect="1" noMove="1" noResize="1" noEditPoints="1" noAdjustHandles="1" noChangeArrowheads="1" noChangeShapeType="1" noTextEdit="1"/>
+          </p:cNvSpPr>
+          <p:nvPr>
+            <p:extLst>
+              <p:ext uri="{386F3935-93C4-4BCD-93E2-E3B085C9AB24}">
+                <p16:designElem xmlns:p16="http://schemas.microsoft.com/office/powerpoint/2015/main" val="1"/>
+              </p:ext>
+            </p:extLst>
+          </p:nvPr>
+        </p:nvSpPr>
+        <p:spPr>
+          <a:xfrm rot="10800000" flipH="1">
+            <a:off x="-3" y="0"/>
+            <a:ext cx="8115306" cy="1590742"/>
+          </a:xfrm>
+          <a:prstGeom prst="rect">
+            <a:avLst/>
+          </a:prstGeom>
+          <a:gradFill>
+            <a:gsLst>
+              <a:gs pos="20000">
+                <a:schemeClr val="accent1">
+                  <a:alpha val="0"/>
+                </a:schemeClr>
+              </a:gs>
+              <a:gs pos="100000">
+                <a:schemeClr val="accent1">
+                  <a:lumMod val="50000"/>
+                  <a:alpha val="55000"/>
+                </a:schemeClr>
+              </a:gs>
+            </a:gsLst>
+            <a:lin ang="13800000" scaled="0"/>
+          </a:gradFill>
+          <a:ln>
+            <a:noFill/>
+          </a:ln>
+        </p:spPr>
+        <p:style>
+          <a:lnRef idx="2">
+            <a:schemeClr val="accent1">
+              <a:shade val="50000"/>
+            </a:schemeClr>
+          </a:lnRef>
+          <a:fillRef idx="1">
+            <a:schemeClr val="accent1"/>
+          </a:fillRef>
+          <a:effectRef idx="0">
+            <a:schemeClr val="accent1"/>
+          </a:effectRef>
+          <a:fontRef idx="minor">
+            <a:schemeClr val="lt1"/>
+          </a:fontRef>
+        </p:style>
+        <p:txBody>
+          <a:bodyPr rtlCol="0" anchor="ctr"/>
+          <a:lstStyle/>
+          <a:p>
+            <a:pPr algn="ctr"/>
+            <a:endParaRPr lang="en-US"/>
+          </a:p>
+        </p:txBody>
+      </p:sp>
+      <p:sp>
+        <p:nvSpPr>
+          <p:cNvPr id="16" name="Rectangle 15">
+            <a:extLst>
+              <a:ext uri="{FF2B5EF4-FFF2-40B4-BE49-F238E27FC236}">
+                <a16:creationId xmlns:a16="http://schemas.microsoft.com/office/drawing/2014/main" id="{375E0459-6403-40CD-989D-56A4407CA12E}"/>
+              </a:ext>
+              <a:ext uri="{C183D7F6-B498-43B3-948B-1728B52AA6E4}">
+                <adec:decorative xmlns:adec="http://schemas.microsoft.com/office/drawing/2017/decorative" val="1"/>
+              </a:ext>
+            </a:extLst>
+          </p:cNvPr>
+          <p:cNvSpPr>
+            <a:spLocks noGrp="1" noRot="1" noChangeAspect="1" noMove="1" noResize="1" noEditPoints="1" noAdjustHandles="1" noChangeArrowheads="1" noChangeShapeType="1" noTextEdit="1"/>
+          </p:cNvSpPr>
+          <p:nvPr>
+            <p:extLst>
+              <p:ext uri="{386F3935-93C4-4BCD-93E2-E3B085C9AB24}">
+                <p16:designElem xmlns:p16="http://schemas.microsoft.com/office/powerpoint/2015/main" val="1"/>
+              </p:ext>
+            </p:extLst>
+          </p:nvPr>
+        </p:nvSpPr>
+        <p:spPr>
+          <a:xfrm flipH="1">
+            <a:off x="8115299" y="-1"/>
+            <a:ext cx="4076698" cy="1590742"/>
+          </a:xfrm>
+          <a:prstGeom prst="rect">
+            <a:avLst/>
+          </a:prstGeom>
+          <a:gradFill>
+            <a:gsLst>
+              <a:gs pos="0">
+                <a:schemeClr val="accent1">
+                  <a:alpha val="66000"/>
+                </a:schemeClr>
+              </a:gs>
+              <a:gs pos="100000">
+                <a:srgbClr val="000000">
+                  <a:alpha val="30000"/>
+                </a:srgbClr>
+              </a:gs>
+            </a:gsLst>
+            <a:lin ang="13200000" scaled="0"/>
+          </a:gradFill>
+          <a:ln>
+            <a:noFill/>
+          </a:ln>
+        </p:spPr>
+        <p:style>
+          <a:lnRef idx="2">
+            <a:schemeClr val="accent1">
+              <a:shade val="50000"/>
+            </a:schemeClr>
+          </a:lnRef>
+          <a:fillRef idx="1">
+            <a:schemeClr val="accent1"/>
+          </a:fillRef>
+          <a:effectRef idx="0">
+            <a:schemeClr val="accent1"/>
+          </a:effectRef>
+          <a:fontRef idx="minor">
+            <a:schemeClr val="lt1"/>
+          </a:fontRef>
+        </p:style>
+        <p:txBody>
+          <a:bodyPr rtlCol="0" anchor="ctr"/>
+          <a:lstStyle/>
+          <a:p>
+            <a:pPr algn="ctr"/>
+            <a:endParaRPr lang="en-US"/>
+          </a:p>
+        </p:txBody>
+      </p:sp>
+      <p:sp>
+        <p:nvSpPr>
+          <p:cNvPr id="18" name="Rectangle 17">
+            <a:extLst>
+              <a:ext uri="{FF2B5EF4-FFF2-40B4-BE49-F238E27FC236}">
+                <a16:creationId xmlns:a16="http://schemas.microsoft.com/office/drawing/2014/main" id="{53E5B1A8-3AC9-4BD1-9BBC-78CA94F2D1BA}"/>
+              </a:ext>
+              <a:ext uri="{C183D7F6-B498-43B3-948B-1728B52AA6E4}">
+                <adec:decorative xmlns:adec="http://schemas.microsoft.com/office/drawing/2017/decorative" val="1"/>
+              </a:ext>
+            </a:extLst>
+          </p:cNvPr>
+          <p:cNvSpPr>
+            <a:spLocks noGrp="1" noRot="1" noChangeAspect="1" noMove="1" noResize="1" noEditPoints="1" noAdjustHandles="1" noChangeArrowheads="1" noChangeShapeType="1" noTextEdit="1"/>
+          </p:cNvSpPr>
+          <p:nvPr>
+            <p:extLst>
+              <p:ext uri="{386F3935-93C4-4BCD-93E2-E3B085C9AB24}">
+                <p16:designElem xmlns:p16="http://schemas.microsoft.com/office/powerpoint/2015/main" val="1"/>
+              </p:ext>
+            </p:extLst>
+          </p:nvPr>
+        </p:nvSpPr>
+        <p:spPr>
+          <a:xfrm>
+            <a:off x="459350" y="-1"/>
+            <a:ext cx="11732646" cy="1597433"/>
+          </a:xfrm>
+          <a:prstGeom prst="rect">
+            <a:avLst/>
+          </a:prstGeom>
+          <a:gradFill>
+            <a:gsLst>
+              <a:gs pos="50000">
+                <a:srgbClr val="000000">
+                  <a:alpha val="0"/>
+                </a:srgbClr>
+              </a:gs>
+              <a:gs pos="99000">
+                <a:schemeClr val="accent1">
+                  <a:lumMod val="50000"/>
+                  <a:alpha val="52000"/>
+                </a:schemeClr>
+              </a:gs>
+            </a:gsLst>
+            <a:lin ang="16800000" scaled="0"/>
+          </a:gradFill>
+          <a:ln>
+            <a:noFill/>
+          </a:ln>
+        </p:spPr>
+        <p:style>
+          <a:lnRef idx="2">
+            <a:schemeClr val="accent1">
+              <a:shade val="50000"/>
+            </a:schemeClr>
+          </a:lnRef>
+          <a:fillRef idx="1">
+            <a:schemeClr val="accent1"/>
+          </a:fillRef>
+          <a:effectRef idx="0">
+            <a:schemeClr val="accent1"/>
+          </a:effectRef>
+          <a:fontRef idx="minor">
+            <a:schemeClr val="lt1"/>
+          </a:fontRef>
+        </p:style>
+        <p:txBody>
+          <a:bodyPr rtlCol="0" anchor="ctr"/>
+          <a:lstStyle/>
+          <a:p>
+            <a:pPr algn="ctr"/>
+            <a:endParaRPr lang="en-US"/>
+          </a:p>
+        </p:txBody>
+      </p:sp>
+      <p:sp>
+        <p:nvSpPr>
+          <p:cNvPr id="2" name="Title 1">
+            <a:extLst>
+              <a:ext uri="{FF2B5EF4-FFF2-40B4-BE49-F238E27FC236}">
+                <a16:creationId xmlns:a16="http://schemas.microsoft.com/office/drawing/2014/main" id="{A0E54775-1744-3EF2-FAED-CEBB5B55B9BA}"/>
+              </a:ext>
+            </a:extLst>
+          </p:cNvPr>
+          <p:cNvSpPr>
+            <a:spLocks noGrp="1"/>
+          </p:cNvSpPr>
+          <p:nvPr>
+            <p:ph type="title"/>
+          </p:nvPr>
+        </p:nvSpPr>
+        <p:spPr>
+          <a:xfrm>
+            <a:off x="1516322" y="449277"/>
+            <a:ext cx="9274629" cy="692187"/>
+          </a:xfrm>
+        </p:spPr>
+        <p:txBody>
+          <a:bodyPr>
+            <a:normAutofit/>
+          </a:bodyPr>
+          <a:lstStyle/>
+          <a:p>
+            <a:r>
+              <a:rPr lang="en-GB" sz="4000" dirty="0">
+                <a:solidFill>
+                  <a:srgbClr val="FFFFFF"/>
+                </a:solidFill>
+              </a:rPr>
+              <a:t>          </a:t>
+            </a:r>
+            <a:r>
+              <a:rPr lang="en-GB" sz="3600" dirty="0">
+                <a:solidFill>
+                  <a:srgbClr val="FFFFFF"/>
+                </a:solidFill>
+              </a:rPr>
+              <a:t>Analysis : Data Understanding And Cleaning </a:t>
+            </a:r>
+          </a:p>
+        </p:txBody>
+      </p:sp>
+      <p:sp>
+        <p:nvSpPr>
+          <p:cNvPr id="3" name="Content Placeholder 2">
+            <a:extLst>
+              <a:ext uri="{FF2B5EF4-FFF2-40B4-BE49-F238E27FC236}">
+                <a16:creationId xmlns:a16="http://schemas.microsoft.com/office/drawing/2014/main" id="{9C26C282-B3C0-6D7F-B5B5-F23C50D096AD}"/>
+              </a:ext>
+            </a:extLst>
+          </p:cNvPr>
+          <p:cNvSpPr>
+            <a:spLocks noGrp="1"/>
+          </p:cNvSpPr>
+          <p:nvPr>
+            <p:ph idx="1"/>
+          </p:nvPr>
+        </p:nvSpPr>
+        <p:spPr>
+          <a:xfrm>
+            <a:off x="228600" y="1622745"/>
+            <a:ext cx="11647714" cy="4378810"/>
+          </a:xfrm>
+        </p:spPr>
+        <p:txBody>
+          <a:bodyPr anchor="ctr">
+            <a:normAutofit/>
+          </a:bodyPr>
+          <a:lstStyle/>
+          <a:p>
+            <a:pPr marL="457200" lvl="1" indent="0">
+              <a:buNone/>
+            </a:pPr>
+            <a:r>
+              <a:rPr lang="en-GB" sz="1800" dirty="0"/>
+              <a:t>                                                                                    </a:t>
+            </a:r>
+          </a:p>
+          <a:p>
+            <a:pPr marL="457200" lvl="1" indent="0">
+              <a:buNone/>
+            </a:pPr>
+            <a:endParaRPr lang="en-GB" sz="1800" dirty="0"/>
+          </a:p>
+          <a:p>
+            <a:pPr marL="0" indent="0">
+              <a:buNone/>
+            </a:pPr>
+            <a:endParaRPr lang="en-GB" sz="2000" dirty="0"/>
+          </a:p>
+        </p:txBody>
+      </p:sp>
+      <p:pic>
+        <p:nvPicPr>
+          <p:cNvPr id="7" name="Picture 6">
+            <a:extLst>
+              <a:ext uri="{FF2B5EF4-FFF2-40B4-BE49-F238E27FC236}">
+                <a16:creationId xmlns:a16="http://schemas.microsoft.com/office/drawing/2014/main" id="{71ECE2D4-2BDA-D3A5-AC12-19A4BF10CB30}"/>
+              </a:ext>
+            </a:extLst>
+          </p:cNvPr>
+          <p:cNvPicPr>
+            <a:picLocks noChangeAspect="1"/>
+          </p:cNvPicPr>
+          <p:nvPr/>
+        </p:nvPicPr>
+        <p:blipFill>
+          <a:blip r:embed="rId2"/>
+          <a:stretch>
+            <a:fillRect/>
+          </a:stretch>
+        </p:blipFill>
+        <p:spPr>
+          <a:xfrm>
+            <a:off x="479810" y="449277"/>
+            <a:ext cx="1016052" cy="692186"/>
+          </a:xfrm>
+          <a:prstGeom prst="rect">
+            <a:avLst/>
+          </a:prstGeom>
+        </p:spPr>
+      </p:pic>
+      <p:sp>
+        <p:nvSpPr>
+          <p:cNvPr id="15" name="TextBox 14">
+            <a:extLst>
+              <a:ext uri="{FF2B5EF4-FFF2-40B4-BE49-F238E27FC236}">
+                <a16:creationId xmlns:a16="http://schemas.microsoft.com/office/drawing/2014/main" id="{B718A8D2-07F8-B6EF-307D-30C9A6BDD947}"/>
+              </a:ext>
+            </a:extLst>
+          </p:cNvPr>
+          <p:cNvSpPr txBox="1"/>
+          <p:nvPr/>
+        </p:nvSpPr>
+        <p:spPr>
+          <a:xfrm>
+            <a:off x="108857" y="1629434"/>
+            <a:ext cx="11157857" cy="5078313"/>
+          </a:xfrm>
+          <a:prstGeom prst="rect">
+            <a:avLst/>
+          </a:prstGeom>
+          <a:noFill/>
+        </p:spPr>
+        <p:txBody>
+          <a:bodyPr wrap="square" rtlCol="0">
+            <a:spAutoFit/>
+          </a:bodyPr>
+          <a:lstStyle/>
+          <a:p>
+            <a:r>
+              <a:rPr lang="en-GB" b="1" dirty="0"/>
+              <a:t>Description of Data Columns which are being considered for Analysis</a:t>
+            </a:r>
+            <a:endParaRPr lang="en-GB" b="1" dirty="0">
+              <a:highlight>
+                <a:srgbClr val="FFFFFF"/>
+              </a:highlight>
+              <a:latin typeface="system-ui"/>
+            </a:endParaRPr>
+          </a:p>
+          <a:p>
+            <a:endParaRPr lang="en-GB" b="1" i="0" dirty="0">
+              <a:effectLst/>
+              <a:highlight>
+                <a:srgbClr val="FFFFFF"/>
+              </a:highlight>
+              <a:latin typeface="system-ui"/>
+            </a:endParaRPr>
+          </a:p>
+          <a:p>
+            <a:r>
+              <a:rPr lang="en-GB" b="1" dirty="0">
+                <a:highlight>
+                  <a:srgbClr val="FFFFFF"/>
+                </a:highlight>
+                <a:latin typeface="system-ui"/>
+              </a:rPr>
+              <a:t>     </a:t>
+            </a:r>
+          </a:p>
+          <a:p>
+            <a:endParaRPr lang="en-GB" b="1" i="0" dirty="0">
+              <a:effectLst/>
+              <a:highlight>
+                <a:srgbClr val="FFFFFF"/>
+              </a:highlight>
+              <a:latin typeface="system-ui"/>
+            </a:endParaRPr>
+          </a:p>
+          <a:p>
+            <a:endParaRPr lang="en-GB" b="1" dirty="0">
+              <a:highlight>
+                <a:srgbClr val="FFFFFF"/>
+              </a:highlight>
+              <a:latin typeface="system-ui"/>
+            </a:endParaRPr>
+          </a:p>
+          <a:p>
+            <a:endParaRPr lang="en-GB" b="1" i="0" dirty="0">
+              <a:effectLst/>
+              <a:highlight>
+                <a:srgbClr val="FFFFFF"/>
+              </a:highlight>
+              <a:latin typeface="system-ui"/>
+            </a:endParaRPr>
+          </a:p>
+          <a:p>
+            <a:endParaRPr lang="en-GB" b="1" dirty="0">
+              <a:highlight>
+                <a:srgbClr val="FFFFFF"/>
+              </a:highlight>
+              <a:latin typeface="system-ui"/>
+            </a:endParaRPr>
+          </a:p>
+          <a:p>
+            <a:endParaRPr lang="en-GB" b="1" i="0" dirty="0">
+              <a:effectLst/>
+              <a:highlight>
+                <a:srgbClr val="FFFFFF"/>
+              </a:highlight>
+              <a:latin typeface="system-ui"/>
+            </a:endParaRPr>
+          </a:p>
+          <a:p>
+            <a:endParaRPr lang="en-GB" b="1" dirty="0">
+              <a:highlight>
+                <a:srgbClr val="FFFFFF"/>
+              </a:highlight>
+              <a:latin typeface="system-ui"/>
+            </a:endParaRPr>
+          </a:p>
+          <a:p>
+            <a:endParaRPr lang="en-GB" b="1" i="0" dirty="0">
+              <a:effectLst/>
+              <a:highlight>
+                <a:srgbClr val="FFFFFF"/>
+              </a:highlight>
+              <a:latin typeface="system-ui"/>
+            </a:endParaRPr>
+          </a:p>
+          <a:p>
+            <a:endParaRPr lang="en-GB" b="1" dirty="0">
+              <a:highlight>
+                <a:srgbClr val="FFFFFF"/>
+              </a:highlight>
+              <a:latin typeface="system-ui"/>
+            </a:endParaRPr>
+          </a:p>
+          <a:p>
+            <a:endParaRPr lang="en-GB" b="1" i="0" dirty="0">
+              <a:effectLst/>
+              <a:highlight>
+                <a:srgbClr val="FFFFFF"/>
+              </a:highlight>
+              <a:latin typeface="system-ui"/>
+            </a:endParaRPr>
+          </a:p>
+          <a:p>
+            <a:endParaRPr lang="en-GB" b="1" dirty="0">
+              <a:highlight>
+                <a:srgbClr val="FFFFFF"/>
+              </a:highlight>
+              <a:latin typeface="system-ui"/>
+            </a:endParaRPr>
+          </a:p>
+          <a:p>
+            <a:endParaRPr lang="en-GB" b="1" i="0" dirty="0">
+              <a:effectLst/>
+              <a:highlight>
+                <a:srgbClr val="FFFFFF"/>
+              </a:highlight>
+              <a:latin typeface="system-ui"/>
+            </a:endParaRPr>
+          </a:p>
+          <a:p>
+            <a:endParaRPr lang="en-GB" b="1" dirty="0">
+              <a:highlight>
+                <a:srgbClr val="FFFFFF"/>
+              </a:highlight>
+              <a:latin typeface="system-ui"/>
+            </a:endParaRPr>
+          </a:p>
+          <a:p>
+            <a:endParaRPr lang="en-GB" b="1" i="0" dirty="0">
+              <a:effectLst/>
+              <a:highlight>
+                <a:srgbClr val="FFFFFF"/>
+              </a:highlight>
+              <a:latin typeface="system-ui"/>
+            </a:endParaRPr>
+          </a:p>
+          <a:p>
+            <a:endParaRPr lang="en-GB" b="1" dirty="0">
+              <a:highlight>
+                <a:srgbClr val="FFFFFF"/>
+              </a:highlight>
+              <a:latin typeface="system-ui"/>
+            </a:endParaRPr>
+          </a:p>
+          <a:p>
+            <a:endParaRPr lang="en-GB" b="0" i="0" dirty="0">
+              <a:effectLst/>
+              <a:highlight>
+                <a:srgbClr val="FFFFFF"/>
+              </a:highlight>
+              <a:latin typeface="system-ui"/>
+            </a:endParaRPr>
+          </a:p>
+        </p:txBody>
+      </p:sp>
+      <p:graphicFrame>
+        <p:nvGraphicFramePr>
+          <p:cNvPr id="4" name="Table 3">
+            <a:extLst>
+              <a:ext uri="{FF2B5EF4-FFF2-40B4-BE49-F238E27FC236}">
+                <a16:creationId xmlns:a16="http://schemas.microsoft.com/office/drawing/2014/main" id="{B8D78B4E-D5AF-32B1-7F0C-20EA47E1E40C}"/>
+              </a:ext>
+            </a:extLst>
+          </p:cNvPr>
+          <p:cNvGraphicFramePr>
+            <a:graphicFrameLocks noGrp="1"/>
+          </p:cNvGraphicFramePr>
+          <p:nvPr>
+            <p:extLst>
+              <p:ext uri="{D42A27DB-BD31-4B8C-83A1-F6EECF244321}">
+                <p14:modId xmlns:p14="http://schemas.microsoft.com/office/powerpoint/2010/main" val="1661691485"/>
+              </p:ext>
+            </p:extLst>
+          </p:nvPr>
+        </p:nvGraphicFramePr>
+        <p:xfrm>
+          <a:off x="169803" y="2040017"/>
+          <a:ext cx="11913340" cy="4634112"/>
+        </p:xfrm>
+        <a:graphic>
+          <a:graphicData uri="http://schemas.openxmlformats.org/drawingml/2006/table">
+            <a:tbl>
+              <a:tblPr firstRow="1" bandRow="1">
+                <a:tableStyleId>{5C22544A-7EE6-4342-B048-85BDC9FD1C3A}</a:tableStyleId>
+              </a:tblPr>
+              <a:tblGrid>
+                <a:gridCol w="1778740">
+                  <a:extLst>
+                    <a:ext uri="{9D8B030D-6E8A-4147-A177-3AD203B41FA5}">
+                      <a16:colId xmlns:a16="http://schemas.microsoft.com/office/drawing/2014/main" val="2827587210"/>
+                    </a:ext>
+                  </a:extLst>
+                </a:gridCol>
+                <a:gridCol w="10134600">
+                  <a:extLst>
+                    <a:ext uri="{9D8B030D-6E8A-4147-A177-3AD203B41FA5}">
+                      <a16:colId xmlns:a16="http://schemas.microsoft.com/office/drawing/2014/main" val="4059677268"/>
+                    </a:ext>
+                  </a:extLst>
+                </a:gridCol>
+              </a:tblGrid>
+              <a:tr h="305376">
+                <a:tc>
+                  <a:txBody>
+                    <a:bodyPr/>
+                    <a:lstStyle/>
+                    <a:p>
+                      <a:r>
+                        <a:rPr lang="en-GB" sz="1200" dirty="0"/>
+                        <a:t>  Column Name</a:t>
+                      </a:r>
+                    </a:p>
+                  </a:txBody>
+                  <a:tcPr/>
+                </a:tc>
+                <a:tc>
+                  <a:txBody>
+                    <a:bodyPr/>
+                    <a:lstStyle/>
+                    <a:p>
+                      <a:r>
+                        <a:rPr lang="en-GB" sz="1200" dirty="0"/>
+                        <a:t>   Description</a:t>
+                      </a:r>
+                    </a:p>
+                  </a:txBody>
+                  <a:tcPr/>
+                </a:tc>
+                <a:extLst>
+                  <a:ext uri="{0D108BD9-81ED-4DB2-BD59-A6C34878D82A}">
+                    <a16:rowId xmlns:a16="http://schemas.microsoft.com/office/drawing/2014/main" val="383560782"/>
+                  </a:ext>
+                </a:extLst>
+              </a:tr>
+              <a:tr h="240979">
+                <a:tc>
+                  <a:txBody>
+                    <a:bodyPr/>
+                    <a:lstStyle/>
+                    <a:p>
+                      <a:r>
+                        <a:rPr lang="en-GB" sz="1200" dirty="0" err="1"/>
+                        <a:t>loan_amnt</a:t>
+                      </a:r>
+                      <a:endParaRPr lang="en-GB" sz="1200" dirty="0"/>
+                    </a:p>
+                  </a:txBody>
+                  <a:tcPr/>
+                </a:tc>
+                <a:tc>
+                  <a:txBody>
+                    <a:bodyPr/>
+                    <a:lstStyle/>
+                    <a:p>
+                      <a:r>
+                        <a:rPr lang="en-GB" sz="1200" dirty="0"/>
+                        <a:t>The Loan Amount borrowed</a:t>
+                      </a:r>
+                    </a:p>
+                  </a:txBody>
+                  <a:tcPr/>
+                </a:tc>
+                <a:extLst>
+                  <a:ext uri="{0D108BD9-81ED-4DB2-BD59-A6C34878D82A}">
+                    <a16:rowId xmlns:a16="http://schemas.microsoft.com/office/drawing/2014/main" val="2826636246"/>
+                  </a:ext>
+                </a:extLst>
+              </a:tr>
+              <a:tr h="240979">
+                <a:tc>
+                  <a:txBody>
+                    <a:bodyPr/>
+                    <a:lstStyle/>
+                    <a:p>
+                      <a:r>
+                        <a:rPr lang="en-GB" sz="1200" dirty="0" err="1"/>
+                        <a:t>int_rate</a:t>
+                      </a:r>
+                      <a:endParaRPr lang="en-GB" sz="1200" dirty="0"/>
+                    </a:p>
+                  </a:txBody>
+                  <a:tcPr/>
+                </a:tc>
+                <a:tc>
+                  <a:txBody>
+                    <a:bodyPr/>
+                    <a:lstStyle/>
+                    <a:p>
+                      <a:r>
+                        <a:rPr lang="en-GB" sz="1200" dirty="0"/>
+                        <a:t>Interest Rate on the loan</a:t>
+                      </a:r>
+                    </a:p>
+                  </a:txBody>
+                  <a:tcPr/>
+                </a:tc>
+                <a:extLst>
+                  <a:ext uri="{0D108BD9-81ED-4DB2-BD59-A6C34878D82A}">
+                    <a16:rowId xmlns:a16="http://schemas.microsoft.com/office/drawing/2014/main" val="1021611157"/>
+                  </a:ext>
+                </a:extLst>
+              </a:tr>
+              <a:tr h="240979">
+                <a:tc>
+                  <a:txBody>
+                    <a:bodyPr/>
+                    <a:lstStyle/>
+                    <a:p>
+                      <a:r>
+                        <a:rPr lang="en-GB" sz="1200" dirty="0" err="1"/>
+                        <a:t>annual_inc</a:t>
+                      </a:r>
+                      <a:endParaRPr lang="en-GB" sz="1200" dirty="0"/>
+                    </a:p>
+                  </a:txBody>
+                  <a:tcPr/>
+                </a:tc>
+                <a:tc>
+                  <a:txBody>
+                    <a:bodyPr/>
+                    <a:lstStyle/>
+                    <a:p>
+                      <a:r>
+                        <a:rPr lang="en-GB" sz="1200" dirty="0"/>
+                        <a:t>The self-reported annual income provided by the borrower during registration.</a:t>
+                      </a:r>
+                    </a:p>
+                  </a:txBody>
+                  <a:tcPr/>
+                </a:tc>
+                <a:extLst>
+                  <a:ext uri="{0D108BD9-81ED-4DB2-BD59-A6C34878D82A}">
+                    <a16:rowId xmlns:a16="http://schemas.microsoft.com/office/drawing/2014/main" val="735853239"/>
+                  </a:ext>
+                </a:extLst>
+              </a:tr>
+              <a:tr h="240979">
+                <a:tc>
+                  <a:txBody>
+                    <a:bodyPr/>
+                    <a:lstStyle/>
+                    <a:p>
+                      <a:r>
+                        <a:rPr lang="en-GB" sz="1200" dirty="0" err="1"/>
+                        <a:t>dti</a:t>
+                      </a:r>
+                      <a:endParaRPr lang="en-GB" sz="1200" dirty="0"/>
+                    </a:p>
+                  </a:txBody>
+                  <a:tcPr/>
+                </a:tc>
+                <a:tc>
+                  <a:txBody>
+                    <a:bodyPr/>
+                    <a:lstStyle/>
+                    <a:p>
+                      <a:r>
+                        <a:rPr lang="en-GB" sz="1200" dirty="0"/>
+                        <a:t>A ratio calculated using the borrower’s total monthly debt payments on the total debt obligations, excluding mortgage and the requested LC loan, divided by the borrower’s self-reported monthly income</a:t>
+                      </a:r>
+                    </a:p>
+                  </a:txBody>
+                  <a:tcPr/>
+                </a:tc>
+                <a:extLst>
+                  <a:ext uri="{0D108BD9-81ED-4DB2-BD59-A6C34878D82A}">
+                    <a16:rowId xmlns:a16="http://schemas.microsoft.com/office/drawing/2014/main" val="2647707664"/>
+                  </a:ext>
+                </a:extLst>
+              </a:tr>
+              <a:tr h="0">
+                <a:tc>
+                  <a:txBody>
+                    <a:bodyPr/>
+                    <a:lstStyle/>
+                    <a:p>
+                      <a:r>
+                        <a:rPr lang="en-GB" sz="1200" dirty="0"/>
+                        <a:t>delinq_2yrs</a:t>
+                      </a:r>
+                    </a:p>
+                  </a:txBody>
+                  <a:tcPr/>
+                </a:tc>
+                <a:tc>
+                  <a:txBody>
+                    <a:bodyPr/>
+                    <a:lstStyle/>
+                    <a:p>
+                      <a:r>
+                        <a:rPr lang="en-GB" sz="1200" dirty="0"/>
+                        <a:t>The number of 30+ days past-due incidences of delinquency in the borrower's credit file for the past 2 years</a:t>
+                      </a:r>
+                    </a:p>
+                  </a:txBody>
+                  <a:tcPr/>
+                </a:tc>
+                <a:extLst>
+                  <a:ext uri="{0D108BD9-81ED-4DB2-BD59-A6C34878D82A}">
+                    <a16:rowId xmlns:a16="http://schemas.microsoft.com/office/drawing/2014/main" val="680507295"/>
+                  </a:ext>
+                </a:extLst>
+              </a:tr>
+              <a:tr h="240979">
+                <a:tc>
+                  <a:txBody>
+                    <a:bodyPr/>
+                    <a:lstStyle/>
+                    <a:p>
+                      <a:r>
+                        <a:rPr lang="en-GB" sz="1200" dirty="0" err="1"/>
+                        <a:t>loan_status</a:t>
+                      </a:r>
+                      <a:endParaRPr lang="en-GB" sz="1200" dirty="0"/>
+                    </a:p>
+                  </a:txBody>
+                  <a:tcPr/>
+                </a:tc>
+                <a:tc>
+                  <a:txBody>
+                    <a:bodyPr/>
+                    <a:lstStyle/>
+                    <a:p>
+                      <a:r>
+                        <a:rPr lang="en-GB" sz="1200" dirty="0"/>
+                        <a:t>Current status of the loan containing  values 'Default' , 'Non-Default' and 'Current'</a:t>
+                      </a:r>
+                    </a:p>
+                  </a:txBody>
+                  <a:tcPr/>
+                </a:tc>
+                <a:extLst>
+                  <a:ext uri="{0D108BD9-81ED-4DB2-BD59-A6C34878D82A}">
+                    <a16:rowId xmlns:a16="http://schemas.microsoft.com/office/drawing/2014/main" val="3969096700"/>
+                  </a:ext>
+                </a:extLst>
+              </a:tr>
+              <a:tr h="240979">
+                <a:tc>
+                  <a:txBody>
+                    <a:bodyPr/>
+                    <a:lstStyle/>
+                    <a:p>
+                      <a:r>
+                        <a:rPr lang="en-GB" sz="1200" dirty="0"/>
+                        <a:t>term</a:t>
+                      </a:r>
+                    </a:p>
+                  </a:txBody>
+                  <a:tcPr/>
+                </a:tc>
+                <a:tc>
+                  <a:txBody>
+                    <a:bodyPr/>
+                    <a:lstStyle/>
+                    <a:p>
+                      <a:r>
+                        <a:rPr lang="en-GB" sz="1200" dirty="0"/>
+                        <a:t>The number of payments on the loan. Values are in months and can be either 36 or 60.</a:t>
+                      </a:r>
+                    </a:p>
+                  </a:txBody>
+                  <a:tcPr/>
+                </a:tc>
+                <a:extLst>
+                  <a:ext uri="{0D108BD9-81ED-4DB2-BD59-A6C34878D82A}">
+                    <a16:rowId xmlns:a16="http://schemas.microsoft.com/office/drawing/2014/main" val="834628936"/>
+                  </a:ext>
+                </a:extLst>
+              </a:tr>
+              <a:tr h="240979">
+                <a:tc>
+                  <a:txBody>
+                    <a:bodyPr/>
+                    <a:lstStyle/>
+                    <a:p>
+                      <a:r>
+                        <a:rPr lang="en-GB" sz="1200" dirty="0"/>
+                        <a:t>grade</a:t>
+                      </a:r>
+                    </a:p>
+                  </a:txBody>
+                  <a:tcPr/>
+                </a:tc>
+                <a:tc>
+                  <a:txBody>
+                    <a:bodyPr/>
+                    <a:lstStyle/>
+                    <a:p>
+                      <a:r>
+                        <a:rPr lang="en-GB" sz="1200" dirty="0"/>
+                        <a:t>LC assigned loan grade </a:t>
+                      </a:r>
+                    </a:p>
+                  </a:txBody>
+                  <a:tcPr/>
+                </a:tc>
+                <a:extLst>
+                  <a:ext uri="{0D108BD9-81ED-4DB2-BD59-A6C34878D82A}">
+                    <a16:rowId xmlns:a16="http://schemas.microsoft.com/office/drawing/2014/main" val="2407605234"/>
+                  </a:ext>
+                </a:extLst>
+              </a:tr>
+              <a:tr h="240979">
+                <a:tc>
+                  <a:txBody>
+                    <a:bodyPr/>
+                    <a:lstStyle/>
+                    <a:p>
+                      <a:r>
+                        <a:rPr lang="en-GB" sz="1200" dirty="0" err="1"/>
+                        <a:t>sub_grade</a:t>
+                      </a:r>
+                      <a:endParaRPr lang="en-GB" sz="1200" dirty="0"/>
+                    </a:p>
+                  </a:txBody>
+                  <a:tcPr/>
+                </a:tc>
+                <a:tc>
+                  <a:txBody>
+                    <a:bodyPr/>
+                    <a:lstStyle/>
+                    <a:p>
+                      <a:r>
+                        <a:rPr lang="en-GB" sz="1200" dirty="0"/>
+                        <a:t>LC assigned loan subgrade</a:t>
+                      </a:r>
+                    </a:p>
+                  </a:txBody>
+                  <a:tcPr/>
+                </a:tc>
+                <a:extLst>
+                  <a:ext uri="{0D108BD9-81ED-4DB2-BD59-A6C34878D82A}">
+                    <a16:rowId xmlns:a16="http://schemas.microsoft.com/office/drawing/2014/main" val="981912889"/>
+                  </a:ext>
+                </a:extLst>
+              </a:tr>
+              <a:tr h="240979">
+                <a:tc>
+                  <a:txBody>
+                    <a:bodyPr/>
+                    <a:lstStyle/>
+                    <a:p>
+                      <a:r>
+                        <a:rPr lang="en-GB" sz="1200" dirty="0" err="1"/>
+                        <a:t>emp_length</a:t>
+                      </a:r>
+                      <a:endParaRPr lang="en-GB" sz="1200" dirty="0"/>
+                    </a:p>
+                  </a:txBody>
+                  <a:tcPr/>
+                </a:tc>
+                <a:tc>
+                  <a:txBody>
+                    <a:bodyPr/>
+                    <a:lstStyle/>
+                    <a:p>
+                      <a:r>
+                        <a:rPr lang="en-GB" sz="1200" dirty="0"/>
+                        <a:t>Employment length in years. Possible values are between 0 and 10 where 0 means less than one year and 10 means ten or more   years.</a:t>
+                      </a:r>
+                    </a:p>
+                  </a:txBody>
+                  <a:tcPr/>
+                </a:tc>
+                <a:extLst>
+                  <a:ext uri="{0D108BD9-81ED-4DB2-BD59-A6C34878D82A}">
+                    <a16:rowId xmlns:a16="http://schemas.microsoft.com/office/drawing/2014/main" val="1139660777"/>
+                  </a:ext>
+                </a:extLst>
+              </a:tr>
+              <a:tr h="240979">
+                <a:tc>
+                  <a:txBody>
+                    <a:bodyPr/>
+                    <a:lstStyle/>
+                    <a:p>
+                      <a:r>
+                        <a:rPr lang="en-GB" sz="1200" dirty="0" err="1"/>
+                        <a:t>home_ownership</a:t>
+                      </a:r>
+                      <a:endParaRPr lang="en-GB" sz="1200" dirty="0"/>
+                    </a:p>
+                  </a:txBody>
+                  <a:tcPr/>
+                </a:tc>
+                <a:tc>
+                  <a:txBody>
+                    <a:bodyPr/>
+                    <a:lstStyle/>
+                    <a:p>
+                      <a:r>
+                        <a:rPr lang="en-GB" sz="1200" dirty="0"/>
+                        <a:t>The home ownership status provided by the borrower during registration. Our values are: RENT, OWN, MORTGAGE, OTHER</a:t>
+                      </a:r>
+                    </a:p>
+                  </a:txBody>
+                  <a:tcPr/>
+                </a:tc>
+                <a:extLst>
+                  <a:ext uri="{0D108BD9-81ED-4DB2-BD59-A6C34878D82A}">
+                    <a16:rowId xmlns:a16="http://schemas.microsoft.com/office/drawing/2014/main" val="1870678978"/>
+                  </a:ext>
+                </a:extLst>
+              </a:tr>
+              <a:tr h="240979">
+                <a:tc>
+                  <a:txBody>
+                    <a:bodyPr/>
+                    <a:lstStyle/>
+                    <a:p>
+                      <a:r>
+                        <a:rPr lang="en-GB" sz="1200" dirty="0" err="1"/>
+                        <a:t>verification_status</a:t>
+                      </a:r>
+                      <a:endParaRPr lang="en-GB" sz="1200" dirty="0"/>
+                    </a:p>
+                  </a:txBody>
+                  <a:tcPr/>
+                </a:tc>
+                <a:tc>
+                  <a:txBody>
+                    <a:bodyPr/>
+                    <a:lstStyle/>
+                    <a:p>
+                      <a:r>
+                        <a:rPr lang="en-GB" sz="1200" dirty="0"/>
+                        <a:t>Indicates if income was verified by LC, not verified, or if the income source was verified </a:t>
+                      </a:r>
+                    </a:p>
+                  </a:txBody>
+                  <a:tcPr/>
+                </a:tc>
+                <a:extLst>
+                  <a:ext uri="{0D108BD9-81ED-4DB2-BD59-A6C34878D82A}">
+                    <a16:rowId xmlns:a16="http://schemas.microsoft.com/office/drawing/2014/main" val="219788583"/>
+                  </a:ext>
+                </a:extLst>
+              </a:tr>
+              <a:tr h="240979">
+                <a:tc>
+                  <a:txBody>
+                    <a:bodyPr/>
+                    <a:lstStyle/>
+                    <a:p>
+                      <a:r>
+                        <a:rPr lang="en-GB" sz="1200" dirty="0"/>
+                        <a:t>purpose</a:t>
+                      </a:r>
+                    </a:p>
+                  </a:txBody>
+                  <a:tcPr/>
+                </a:tc>
+                <a:tc>
+                  <a:txBody>
+                    <a:bodyPr/>
+                    <a:lstStyle/>
+                    <a:p>
+                      <a:r>
+                        <a:rPr lang="en-GB" sz="1200" dirty="0"/>
+                        <a:t> A category provided by the borrower for the loan request.</a:t>
+                      </a:r>
+                    </a:p>
+                  </a:txBody>
+                  <a:tcPr/>
+                </a:tc>
+                <a:extLst>
+                  <a:ext uri="{0D108BD9-81ED-4DB2-BD59-A6C34878D82A}">
+                    <a16:rowId xmlns:a16="http://schemas.microsoft.com/office/drawing/2014/main" val="932074044"/>
+                  </a:ext>
+                </a:extLst>
+              </a:tr>
+              <a:tr h="240979">
+                <a:tc>
+                  <a:txBody>
+                    <a:bodyPr/>
+                    <a:lstStyle/>
+                    <a:p>
+                      <a:r>
+                        <a:rPr lang="en-GB" sz="1200" dirty="0" err="1"/>
+                        <a:t>addr_state</a:t>
+                      </a:r>
+                      <a:endParaRPr lang="en-GB" sz="1200" dirty="0"/>
+                    </a:p>
+                  </a:txBody>
+                  <a:tcPr/>
+                </a:tc>
+                <a:tc>
+                  <a:txBody>
+                    <a:bodyPr/>
+                    <a:lstStyle/>
+                    <a:p>
+                      <a:r>
+                        <a:rPr lang="en-GB" sz="1200" dirty="0"/>
+                        <a:t>Number of derogatory public records</a:t>
+                      </a:r>
+                    </a:p>
+                  </a:txBody>
+                  <a:tcPr/>
+                </a:tc>
+                <a:extLst>
+                  <a:ext uri="{0D108BD9-81ED-4DB2-BD59-A6C34878D82A}">
+                    <a16:rowId xmlns:a16="http://schemas.microsoft.com/office/drawing/2014/main" val="2679353408"/>
+                  </a:ext>
+                </a:extLst>
+              </a:tr>
+              <a:tr h="305376">
+                <a:tc>
+                  <a:txBody>
+                    <a:bodyPr/>
+                    <a:lstStyle/>
+                    <a:p>
+                      <a:r>
+                        <a:rPr lang="en-GB" sz="1200" dirty="0" err="1"/>
+                        <a:t>pub_rec_bankruptcies</a:t>
+                      </a:r>
+                      <a:endParaRPr lang="en-GB" sz="1200" dirty="0"/>
+                    </a:p>
+                  </a:txBody>
+                  <a:tcPr/>
+                </a:tc>
+                <a:tc>
+                  <a:txBody>
+                    <a:bodyPr/>
+                    <a:lstStyle/>
+                    <a:p>
+                      <a:r>
+                        <a:rPr lang="en-GB" sz="1200" dirty="0"/>
+                        <a:t>Number of public record bankruptcies</a:t>
+                      </a:r>
+                    </a:p>
+                  </a:txBody>
+                  <a:tcPr/>
+                </a:tc>
+                <a:extLst>
+                  <a:ext uri="{0D108BD9-81ED-4DB2-BD59-A6C34878D82A}">
+                    <a16:rowId xmlns:a16="http://schemas.microsoft.com/office/drawing/2014/main" val="421916425"/>
+                  </a:ext>
+                </a:extLst>
+              </a:tr>
+            </a:tbl>
+          </a:graphicData>
+        </a:graphic>
+      </p:graphicFrame>
+    </p:spTree>
+    <p:extLst>
+      <p:ext uri="{BB962C8B-B14F-4D97-AF65-F5344CB8AC3E}">
+        <p14:creationId xmlns:p14="http://schemas.microsoft.com/office/powerpoint/2010/main" val="4128299917"/>
+      </p:ext>
+    </p:extLst>
+  </p:cSld>
+  <p:clrMapOvr>
+    <a:masterClrMapping/>
+  </p:clrMapOvr>
+</p:sld>
+</file>
+
+<file path=ppt/slides/slide6.xml><?xml version="1.0" encoding="utf-8"?>
 <p:sld xmlns:a="http://schemas.openxmlformats.org/drawingml/2006/main" xmlns:r="http://schemas.openxmlformats.org/officeDocument/2006/relationships" xmlns:p="http://schemas.openxmlformats.org/presentationml/2006/main">
   <p:cSld>
     <p:spTree>
@@ -11412,7 +13066,7 @@
 </p:sld>
 </file>
 
-<file path=ppt/slides/slide6.xml><?xml version="1.0" encoding="utf-8"?>
+<file path=ppt/slides/slide7.xml><?xml version="1.0" encoding="utf-8"?>
 <p:sld xmlns:a="http://schemas.openxmlformats.org/drawingml/2006/main" xmlns:r="http://schemas.openxmlformats.org/officeDocument/2006/relationships" xmlns:p="http://schemas.openxmlformats.org/presentationml/2006/main">
   <p:cSld>
     <p:spTree>
@@ -11627,7 +13281,7 @@
 </p:sld>
 </file>
 
-<file path=ppt/slides/slide7.xml><?xml version="1.0" encoding="utf-8"?>
+<file path=ppt/slides/slide8.xml><?xml version="1.0" encoding="utf-8"?>
 <p:sld xmlns:a="http://schemas.openxmlformats.org/drawingml/2006/main" xmlns:r="http://schemas.openxmlformats.org/officeDocument/2006/relationships" xmlns:p="http://schemas.openxmlformats.org/presentationml/2006/main">
   <p:cSld>
     <p:spTree>
@@ -12079,7 +13733,7 @@
 </p:sld>
 </file>
 
-<file path=ppt/slides/slide8.xml><?xml version="1.0" encoding="utf-8"?>
+<file path=ppt/slides/slide9.xml><?xml version="1.0" encoding="utf-8"?>
 <p:sld xmlns:a="http://schemas.openxmlformats.org/drawingml/2006/main" xmlns:r="http://schemas.openxmlformats.org/officeDocument/2006/relationships" xmlns:p="http://schemas.openxmlformats.org/presentationml/2006/main">
   <p:cSld>
     <p:spTree>
@@ -12393,329 +14047,6 @@
     <p:extLst>
       <p:ext uri="{BB962C8B-B14F-4D97-AF65-F5344CB8AC3E}">
         <p14:creationId xmlns:p14="http://schemas.microsoft.com/office/powerpoint/2010/main" val="3315722652"/>
-      </p:ext>
-    </p:extLst>
-  </p:cSld>
-  <p:clrMapOvr>
-    <a:masterClrMapping/>
-  </p:clrMapOvr>
-</p:sld>
-</file>
-
-<file path=ppt/slides/slide9.xml><?xml version="1.0" encoding="utf-8"?>
-<p:sld xmlns:a="http://schemas.openxmlformats.org/drawingml/2006/main" xmlns:r="http://schemas.openxmlformats.org/officeDocument/2006/relationships" xmlns:p="http://schemas.openxmlformats.org/presentationml/2006/main">
-  <p:cSld>
-    <p:spTree>
-      <p:nvGrpSpPr>
-        <p:cNvPr id="1" name=""/>
-        <p:cNvGrpSpPr/>
-        <p:nvPr/>
-      </p:nvGrpSpPr>
-      <p:grpSpPr>
-        <a:xfrm>
-          <a:off x="0" y="0"/>
-          <a:ext cx="0" cy="0"/>
-          <a:chOff x="0" y="0"/>
-          <a:chExt cx="0" cy="0"/>
-        </a:xfrm>
-      </p:grpSpPr>
-      <p:sp>
-        <p:nvSpPr>
-          <p:cNvPr id="5" name="Title 1">
-            <a:extLst>
-              <a:ext uri="{FF2B5EF4-FFF2-40B4-BE49-F238E27FC236}">
-                <a16:creationId xmlns:a16="http://schemas.microsoft.com/office/drawing/2014/main" id="{00C4D573-60F6-882F-6BED-51E9C908CC76}"/>
-              </a:ext>
-            </a:extLst>
-          </p:cNvPr>
-          <p:cNvSpPr>
-            <a:spLocks noGrp="1"/>
-          </p:cNvSpPr>
-          <p:nvPr>
-            <p:ph type="title"/>
-          </p:nvPr>
-        </p:nvSpPr>
-        <p:spPr>
-          <a:xfrm>
-            <a:off x="398029" y="103398"/>
-            <a:ext cx="11572297" cy="703263"/>
-          </a:xfrm>
-          <a:solidFill>
-            <a:schemeClr val="accent1">
-              <a:lumMod val="75000"/>
-            </a:schemeClr>
-          </a:solidFill>
-        </p:spPr>
-        <p:txBody>
-          <a:bodyPr>
-            <a:normAutofit/>
-          </a:bodyPr>
-          <a:lstStyle/>
-          <a:p>
-            <a:pPr algn="just"/>
-            <a:r>
-              <a:rPr lang="en-GB" sz="4000" dirty="0"/>
-              <a:t>                  </a:t>
-            </a:r>
-            <a:r>
-              <a:rPr lang="en-GB" sz="2800" dirty="0">
-                <a:solidFill>
-                  <a:schemeClr val="bg2"/>
-                </a:solidFill>
-              </a:rPr>
-              <a:t>Analysis :Bivariate Analysis of Categorical Fields</a:t>
-            </a:r>
-          </a:p>
-        </p:txBody>
-      </p:sp>
-      <p:pic>
-        <p:nvPicPr>
-          <p:cNvPr id="7" name="Picture 6">
-            <a:extLst>
-              <a:ext uri="{FF2B5EF4-FFF2-40B4-BE49-F238E27FC236}">
-                <a16:creationId xmlns:a16="http://schemas.microsoft.com/office/drawing/2014/main" id="{83F5A113-F0D8-A33D-0CD2-E12E3547041E}"/>
-              </a:ext>
-            </a:extLst>
-          </p:cNvPr>
-          <p:cNvPicPr>
-            <a:picLocks noChangeAspect="1"/>
-          </p:cNvPicPr>
-          <p:nvPr/>
-        </p:nvPicPr>
-        <p:blipFill>
-          <a:blip r:embed="rId3"/>
-          <a:stretch>
-            <a:fillRect/>
-          </a:stretch>
-        </p:blipFill>
-        <p:spPr>
-          <a:xfrm>
-            <a:off x="540644" y="240635"/>
-            <a:ext cx="838556" cy="428788"/>
-          </a:xfrm>
-          <a:prstGeom prst="rect">
-            <a:avLst/>
-          </a:prstGeom>
-        </p:spPr>
-      </p:pic>
-      <p:sp>
-        <p:nvSpPr>
-          <p:cNvPr id="8" name="TextBox 7">
-            <a:extLst>
-              <a:ext uri="{FF2B5EF4-FFF2-40B4-BE49-F238E27FC236}">
-                <a16:creationId xmlns:a16="http://schemas.microsoft.com/office/drawing/2014/main" id="{9A75BAFA-1C42-2E14-3759-6472BB60C57C}"/>
-              </a:ext>
-            </a:extLst>
-          </p:cNvPr>
-          <p:cNvSpPr txBox="1"/>
-          <p:nvPr/>
-        </p:nvSpPr>
-        <p:spPr>
-          <a:xfrm>
-            <a:off x="398029" y="806660"/>
-            <a:ext cx="10972800" cy="369332"/>
-          </a:xfrm>
-          <a:prstGeom prst="rect">
-            <a:avLst/>
-          </a:prstGeom>
-          <a:noFill/>
-        </p:spPr>
-        <p:txBody>
-          <a:bodyPr wrap="square" rtlCol="0">
-            <a:spAutoFit/>
-          </a:bodyPr>
-          <a:lstStyle/>
-          <a:p>
-            <a:r>
-              <a:rPr lang="en-GB" b="1" dirty="0"/>
-              <a:t>Bivariate analysis indicating  following fields do not have a considerable impact on loan status</a:t>
-            </a:r>
-          </a:p>
-        </p:txBody>
-      </p:sp>
-      <p:pic>
-        <p:nvPicPr>
-          <p:cNvPr id="31" name="Content Placeholder 30">
-            <a:extLst>
-              <a:ext uri="{FF2B5EF4-FFF2-40B4-BE49-F238E27FC236}">
-                <a16:creationId xmlns:a16="http://schemas.microsoft.com/office/drawing/2014/main" id="{F5670231-FCA1-9E21-2CBA-27DEC4957ED1}"/>
-              </a:ext>
-            </a:extLst>
-          </p:cNvPr>
-          <p:cNvPicPr>
-            <a:picLocks noGrp="1" noChangeAspect="1"/>
-          </p:cNvPicPr>
-          <p:nvPr>
-            <p:ph idx="1"/>
-          </p:nvPr>
-        </p:nvPicPr>
-        <p:blipFill>
-          <a:blip r:embed="rId4"/>
-          <a:stretch>
-            <a:fillRect/>
-          </a:stretch>
-        </p:blipFill>
-        <p:spPr>
-          <a:xfrm>
-            <a:off x="0" y="1214094"/>
-            <a:ext cx="4601459" cy="2482978"/>
-          </a:xfrm>
-        </p:spPr>
-      </p:pic>
-      <p:pic>
-        <p:nvPicPr>
-          <p:cNvPr id="33" name="Picture 32">
-            <a:extLst>
-              <a:ext uri="{FF2B5EF4-FFF2-40B4-BE49-F238E27FC236}">
-                <a16:creationId xmlns:a16="http://schemas.microsoft.com/office/drawing/2014/main" id="{CFB2EAAF-053B-6A24-3D65-6E30E056B964}"/>
-              </a:ext>
-            </a:extLst>
-          </p:cNvPr>
-          <p:cNvPicPr>
-            <a:picLocks noChangeAspect="1"/>
-          </p:cNvPicPr>
-          <p:nvPr/>
-        </p:nvPicPr>
-        <p:blipFill>
-          <a:blip r:embed="rId5"/>
-          <a:stretch>
-            <a:fillRect/>
-          </a:stretch>
-        </p:blipFill>
-        <p:spPr>
-          <a:xfrm>
-            <a:off x="4708337" y="1313495"/>
-            <a:ext cx="3904035" cy="2284175"/>
-          </a:xfrm>
-          <a:prstGeom prst="rect">
-            <a:avLst/>
-          </a:prstGeom>
-        </p:spPr>
-      </p:pic>
-      <p:pic>
-        <p:nvPicPr>
-          <p:cNvPr id="35" name="Picture 34">
-            <a:extLst>
-              <a:ext uri="{FF2B5EF4-FFF2-40B4-BE49-F238E27FC236}">
-                <a16:creationId xmlns:a16="http://schemas.microsoft.com/office/drawing/2014/main" id="{799FE78C-567C-5A21-7A4F-F8AC571AE850}"/>
-              </a:ext>
-            </a:extLst>
-          </p:cNvPr>
-          <p:cNvPicPr>
-            <a:picLocks noChangeAspect="1"/>
-          </p:cNvPicPr>
-          <p:nvPr/>
-        </p:nvPicPr>
-        <p:blipFill>
-          <a:blip r:embed="rId6"/>
-          <a:stretch>
-            <a:fillRect/>
-          </a:stretch>
-        </p:blipFill>
-        <p:spPr>
-          <a:xfrm>
-            <a:off x="0" y="4104505"/>
-            <a:ext cx="4601459" cy="2635385"/>
-          </a:xfrm>
-          <a:prstGeom prst="rect">
-            <a:avLst/>
-          </a:prstGeom>
-        </p:spPr>
-      </p:pic>
-      <p:pic>
-        <p:nvPicPr>
-          <p:cNvPr id="37" name="Picture 36">
-            <a:extLst>
-              <a:ext uri="{FF2B5EF4-FFF2-40B4-BE49-F238E27FC236}">
-                <a16:creationId xmlns:a16="http://schemas.microsoft.com/office/drawing/2014/main" id="{5ADA374A-0A25-975C-E9AE-1285C919E9D9}"/>
-              </a:ext>
-            </a:extLst>
-          </p:cNvPr>
-          <p:cNvPicPr>
-            <a:picLocks noChangeAspect="1"/>
-          </p:cNvPicPr>
-          <p:nvPr/>
-        </p:nvPicPr>
-        <p:blipFill>
-          <a:blip r:embed="rId7"/>
-          <a:stretch>
-            <a:fillRect/>
-          </a:stretch>
-        </p:blipFill>
-        <p:spPr>
-          <a:xfrm>
-            <a:off x="4708337" y="4104505"/>
-            <a:ext cx="3904035" cy="2654436"/>
-          </a:xfrm>
-          <a:prstGeom prst="rect">
-            <a:avLst/>
-          </a:prstGeom>
-        </p:spPr>
-      </p:pic>
-      <p:pic>
-        <p:nvPicPr>
-          <p:cNvPr id="39" name="Picture 38">
-            <a:extLst>
-              <a:ext uri="{FF2B5EF4-FFF2-40B4-BE49-F238E27FC236}">
-                <a16:creationId xmlns:a16="http://schemas.microsoft.com/office/drawing/2014/main" id="{2A1024A1-F00F-7E75-6F91-CBF35082E68B}"/>
-              </a:ext>
-            </a:extLst>
-          </p:cNvPr>
-          <p:cNvPicPr>
-            <a:picLocks noChangeAspect="1"/>
-          </p:cNvPicPr>
-          <p:nvPr/>
-        </p:nvPicPr>
-        <p:blipFill>
-          <a:blip r:embed="rId8"/>
-          <a:stretch>
-            <a:fillRect/>
-          </a:stretch>
-        </p:blipFill>
-        <p:spPr>
-          <a:xfrm>
-            <a:off x="8856921" y="4029741"/>
-            <a:ext cx="3335079" cy="2774246"/>
-          </a:xfrm>
-          <a:prstGeom prst="rect">
-            <a:avLst/>
-          </a:prstGeom>
-        </p:spPr>
-      </p:pic>
-      <p:pic>
-        <p:nvPicPr>
-          <p:cNvPr id="41" name="Picture 40">
-            <a:extLst>
-              <a:ext uri="{FF2B5EF4-FFF2-40B4-BE49-F238E27FC236}">
-                <a16:creationId xmlns:a16="http://schemas.microsoft.com/office/drawing/2014/main" id="{4876E4AA-1109-7762-452E-AA2219EE62EB}"/>
-              </a:ext>
-            </a:extLst>
-          </p:cNvPr>
-          <p:cNvPicPr>
-            <a:picLocks noChangeAspect="1"/>
-          </p:cNvPicPr>
-          <p:nvPr/>
-        </p:nvPicPr>
-        <p:blipFill>
-          <a:blip r:embed="rId9"/>
-          <a:stretch>
-            <a:fillRect/>
-          </a:stretch>
-        </p:blipFill>
-        <p:spPr>
-          <a:xfrm>
-            <a:off x="8856921" y="1291018"/>
-            <a:ext cx="3113405" cy="2254366"/>
-          </a:xfrm>
-          <a:prstGeom prst="rect">
-            <a:avLst/>
-          </a:prstGeom>
-        </p:spPr>
-      </p:pic>
-    </p:spTree>
-    <p:extLst>
-      <p:ext uri="{BB962C8B-B14F-4D97-AF65-F5344CB8AC3E}">
-        <p14:creationId xmlns:p14="http://schemas.microsoft.com/office/powerpoint/2010/main" val="3356930452"/>
       </p:ext>
     </p:extLst>
   </p:cSld>

</xml_diff>

<commit_message>
Modified Analysis to not consider loan status which are 'Current'
</commit_message>
<xml_diff>
--- a/LendingClubCaseStudy.pptx
+++ b/LendingClubCaseStudy.pptx
@@ -7980,10 +7980,10 @@
       </p:sp>
       <p:pic>
         <p:nvPicPr>
-          <p:cNvPr id="31" name="Content Placeholder 30">
-            <a:extLst>
-              <a:ext uri="{FF2B5EF4-FFF2-40B4-BE49-F238E27FC236}">
-                <a16:creationId xmlns:a16="http://schemas.microsoft.com/office/drawing/2014/main" id="{F5670231-FCA1-9E21-2CBA-27DEC4957ED1}"/>
+          <p:cNvPr id="14" name="Content Placeholder 13">
+            <a:extLst>
+              <a:ext uri="{FF2B5EF4-FFF2-40B4-BE49-F238E27FC236}">
+                <a16:creationId xmlns:a16="http://schemas.microsoft.com/office/drawing/2014/main" id="{A0C580C4-7957-08E8-1221-6C11D4880C6B}"/>
               </a:ext>
             </a:extLst>
           </p:cNvPr>
@@ -8002,17 +8002,17 @@
         </p:blipFill>
         <p:spPr>
           <a:xfrm>
-            <a:off x="0" y="1214094"/>
-            <a:ext cx="4601459" cy="2482978"/>
+            <a:off x="8512040" y="4119217"/>
+            <a:ext cx="3679960" cy="2635385"/>
           </a:xfrm>
         </p:spPr>
       </p:pic>
       <p:pic>
         <p:nvPicPr>
-          <p:cNvPr id="33" name="Picture 32">
-            <a:extLst>
-              <a:ext uri="{FF2B5EF4-FFF2-40B4-BE49-F238E27FC236}">
-                <a16:creationId xmlns:a16="http://schemas.microsoft.com/office/drawing/2014/main" id="{CFB2EAAF-053B-6A24-3D65-6E30E056B964}"/>
+          <p:cNvPr id="6" name="Picture 5">
+            <a:extLst>
+              <a:ext uri="{FF2B5EF4-FFF2-40B4-BE49-F238E27FC236}">
+                <a16:creationId xmlns:a16="http://schemas.microsoft.com/office/drawing/2014/main" id="{F71D3ECB-DA16-0B36-5F17-3EF5A3C622A7}"/>
               </a:ext>
             </a:extLst>
           </p:cNvPr>
@@ -8029,8 +8029,8 @@
         </p:blipFill>
         <p:spPr>
           <a:xfrm>
-            <a:off x="4708337" y="1313495"/>
-            <a:ext cx="3904035" cy="2284175"/>
+            <a:off x="288336" y="1319056"/>
+            <a:ext cx="4087721" cy="2311519"/>
           </a:xfrm>
           <a:prstGeom prst="rect">
             <a:avLst/>
@@ -8039,10 +8039,10 @@
       </p:pic>
       <p:pic>
         <p:nvPicPr>
-          <p:cNvPr id="35" name="Picture 34">
-            <a:extLst>
-              <a:ext uri="{FF2B5EF4-FFF2-40B4-BE49-F238E27FC236}">
-                <a16:creationId xmlns:a16="http://schemas.microsoft.com/office/drawing/2014/main" id="{799FE78C-567C-5A21-7A4F-F8AC571AE850}"/>
+          <p:cNvPr id="10" name="Picture 9">
+            <a:extLst>
+              <a:ext uri="{FF2B5EF4-FFF2-40B4-BE49-F238E27FC236}">
+                <a16:creationId xmlns:a16="http://schemas.microsoft.com/office/drawing/2014/main" id="{7F2712C2-4297-4867-75B1-75CEFFDE4A4F}"/>
               </a:ext>
             </a:extLst>
           </p:cNvPr>
@@ -8059,8 +8059,8 @@
         </p:blipFill>
         <p:spPr>
           <a:xfrm>
-            <a:off x="0" y="4104505"/>
-            <a:ext cx="4601459" cy="2635385"/>
+            <a:off x="4702041" y="1287305"/>
+            <a:ext cx="3679960" cy="2343270"/>
           </a:xfrm>
           <a:prstGeom prst="rect">
             <a:avLst/>
@@ -8069,10 +8069,10 @@
       </p:pic>
       <p:pic>
         <p:nvPicPr>
-          <p:cNvPr id="37" name="Picture 36">
-            <a:extLst>
-              <a:ext uri="{FF2B5EF4-FFF2-40B4-BE49-F238E27FC236}">
-                <a16:creationId xmlns:a16="http://schemas.microsoft.com/office/drawing/2014/main" id="{5ADA374A-0A25-975C-E9AE-1285C919E9D9}"/>
+          <p:cNvPr id="12" name="Picture 11">
+            <a:extLst>
+              <a:ext uri="{FF2B5EF4-FFF2-40B4-BE49-F238E27FC236}">
+                <a16:creationId xmlns:a16="http://schemas.microsoft.com/office/drawing/2014/main" id="{A5CA811C-EA9F-DEC0-E3CA-EBE46C64293D}"/>
               </a:ext>
             </a:extLst>
           </p:cNvPr>
@@ -8089,8 +8089,8 @@
         </p:blipFill>
         <p:spPr>
           <a:xfrm>
-            <a:off x="4708337" y="4104505"/>
-            <a:ext cx="3904035" cy="2654436"/>
+            <a:off x="8512040" y="1287305"/>
+            <a:ext cx="3679960" cy="2559182"/>
           </a:xfrm>
           <a:prstGeom prst="rect">
             <a:avLst/>
@@ -8099,10 +8099,10 @@
       </p:pic>
       <p:pic>
         <p:nvPicPr>
-          <p:cNvPr id="39" name="Picture 38">
-            <a:extLst>
-              <a:ext uri="{FF2B5EF4-FFF2-40B4-BE49-F238E27FC236}">
-                <a16:creationId xmlns:a16="http://schemas.microsoft.com/office/drawing/2014/main" id="{2A1024A1-F00F-7E75-6F91-CBF35082E68B}"/>
+          <p:cNvPr id="16" name="Picture 15">
+            <a:extLst>
+              <a:ext uri="{FF2B5EF4-FFF2-40B4-BE49-F238E27FC236}">
+                <a16:creationId xmlns:a16="http://schemas.microsoft.com/office/drawing/2014/main" id="{4FE3C82C-5C83-25BC-E775-B34812167AE5}"/>
               </a:ext>
             </a:extLst>
           </p:cNvPr>
@@ -8119,8 +8119,8 @@
         </p:blipFill>
         <p:spPr>
           <a:xfrm>
-            <a:off x="8856921" y="4029741"/>
-            <a:ext cx="3335079" cy="2774246"/>
+            <a:off x="4702041" y="4119217"/>
+            <a:ext cx="3738394" cy="2235315"/>
           </a:xfrm>
           <a:prstGeom prst="rect">
             <a:avLst/>
@@ -8129,10 +8129,10 @@
       </p:pic>
       <p:pic>
         <p:nvPicPr>
-          <p:cNvPr id="41" name="Picture 40">
-            <a:extLst>
-              <a:ext uri="{FF2B5EF4-FFF2-40B4-BE49-F238E27FC236}">
-                <a16:creationId xmlns:a16="http://schemas.microsoft.com/office/drawing/2014/main" id="{4876E4AA-1109-7762-452E-AA2219EE62EB}"/>
+          <p:cNvPr id="18" name="Picture 17">
+            <a:extLst>
+              <a:ext uri="{FF2B5EF4-FFF2-40B4-BE49-F238E27FC236}">
+                <a16:creationId xmlns:a16="http://schemas.microsoft.com/office/drawing/2014/main" id="{5611FEDD-EA45-8181-59A7-78E8C3DBA0FA}"/>
               </a:ext>
             </a:extLst>
           </p:cNvPr>
@@ -8149,8 +8149,8 @@
         </p:blipFill>
         <p:spPr>
           <a:xfrm>
-            <a:off x="8856921" y="1291018"/>
-            <a:ext cx="3113405" cy="2254366"/>
+            <a:off x="0" y="3976334"/>
+            <a:ext cx="4615543" cy="2521080"/>
           </a:xfrm>
           <a:prstGeom prst="rect">
             <a:avLst/>
@@ -10927,7 +10927,7 @@
                 </a:highlight>
                 <a:latin typeface="system-ui"/>
               </a:rPr>
-              <a:t>The initial Data Frame of shape(rows , columns)  (39717, 111) was reduced to (39717, 54)</a:t>
+              <a:t>The initial Data Frame of shape(rows , columns)  (39717, 111) was reduced to (38577, 54)</a:t>
             </a:r>
             <a:endParaRPr lang="en-GB" dirty="0">
               <a:highlight>
@@ -11285,6 +11285,120 @@
               <a:rPr lang="en-GB" dirty="0"/>
               <a:t>  </a:t>
             </a:r>
+          </a:p>
+        </p:txBody>
+      </p:sp>
+      <p:sp>
+        <p:nvSpPr>
+          <p:cNvPr id="4" name="Rectangle 1">
+            <a:extLst>
+              <a:ext uri="{FF2B5EF4-FFF2-40B4-BE49-F238E27FC236}">
+                <a16:creationId xmlns:a16="http://schemas.microsoft.com/office/drawing/2014/main" id="{B16FC672-0EA7-0D18-479A-472618DD5FB9}"/>
+              </a:ext>
+            </a:extLst>
+          </p:cNvPr>
+          <p:cNvSpPr>
+            <a:spLocks noChangeArrowheads="1"/>
+          </p:cNvSpPr>
+          <p:nvPr/>
+        </p:nvSpPr>
+        <p:spPr bwMode="auto">
+          <a:xfrm>
+            <a:off x="0" y="0"/>
+            <a:ext cx="12192000" cy="457200"/>
+          </a:xfrm>
+          <a:prstGeom prst="rect">
+            <a:avLst/>
+          </a:prstGeom>
+          <a:solidFill>
+            <a:srgbClr val="FFFFFF"/>
+          </a:solidFill>
+          <a:ln>
+            <a:noFill/>
+          </a:ln>
+          <a:effectLst/>
+          <a:extLst>
+            <a:ext uri="{91240B29-F687-4F45-9708-019B960494DF}">
+              <a14:hiddenLine xmlns:a14="http://schemas.microsoft.com/office/drawing/2010/main" w="9525">
+                <a:solidFill>
+                  <a:schemeClr val="tx1"/>
+                </a:solidFill>
+                <a:miter lim="800000"/>
+                <a:headEnd/>
+                <a:tailEnd/>
+              </a14:hiddenLine>
+            </a:ext>
+            <a:ext uri="{AF507438-7753-43E0-B8FC-AC1667EBCBE1}">
+              <a14:hiddenEffects xmlns:a14="http://schemas.microsoft.com/office/drawing/2010/main">
+                <a:effectLst>
+                  <a:outerShdw dist="35921" dir="2700000" algn="ctr" rotWithShape="0">
+                    <a:schemeClr val="bg2"/>
+                  </a:outerShdw>
+                </a:effectLst>
+              </a14:hiddenEffects>
+            </a:ext>
+          </a:extLst>
+        </p:spPr>
+        <p:txBody>
+          <a:bodyPr vert="horz" wrap="none" lIns="0" tIns="0" rIns="0" bIns="0" numCol="1" anchor="ctr" anchorCtr="0" compatLnSpc="1">
+            <a:prstTxWarp prst="textNoShape">
+              <a:avLst/>
+            </a:prstTxWarp>
+            <a:spAutoFit/>
+          </a:bodyPr>
+          <a:lstStyle/>
+          <a:p>
+            <a:pPr marL="0" marR="0" lvl="0" indent="0" algn="l" defTabSz="914400" rtl="0" eaLnBrk="0" fontAlgn="base" latinLnBrk="0" hangingPunct="0">
+              <a:lnSpc>
+                <a:spcPct val="100000"/>
+              </a:lnSpc>
+              <a:spcBef>
+                <a:spcPct val="0"/>
+              </a:spcBef>
+              <a:spcAft>
+                <a:spcPct val="0"/>
+              </a:spcAft>
+              <a:buClrTx/>
+              <a:buSzTx/>
+              <a:buFontTx/>
+              <a:buNone/>
+              <a:tabLst/>
+            </a:pPr>
+            <a:r>
+              <a:rPr kumimoji="0" lang="en-US" altLang="en-US" sz="900" b="0" i="0" u="none" strike="noStrike" cap="none" normalizeH="0" baseline="0">
+                <a:ln>
+                  <a:noFill/>
+                </a:ln>
+                <a:solidFill>
+                  <a:schemeClr val="tx1"/>
+                </a:solidFill>
+                <a:effectLst/>
+                <a:latin typeface="var(--jp-code-font-family)"/>
+              </a:rPr>
+              <a:t>(38577, 54)</a:t>
+            </a:r>
+            <a:r>
+              <a:rPr kumimoji="0" lang="en-US" altLang="en-US" sz="800" b="0" i="0" u="none" strike="noStrike" cap="none" normalizeH="0" baseline="0">
+                <a:ln>
+                  <a:noFill/>
+                </a:ln>
+                <a:solidFill>
+                  <a:schemeClr val="tx1"/>
+                </a:solidFill>
+                <a:effectLst/>
+              </a:rPr>
+              <a:t> </a:t>
+            </a:r>
+            <a:endParaRPr kumimoji="0" lang="en-US" altLang="en-US" sz="1800" b="0" i="0" u="none" strike="noStrike" cap="none" normalizeH="0" baseline="0">
+              <a:ln>
+                <a:noFill/>
+              </a:ln>
+              <a:solidFill>
+                <a:schemeClr val="tx1"/>
+              </a:solidFill>
+              <a:effectLst/>
+              <a:latin typeface="Arial" panose="020B0604020202020204" pitchFamily="34" charset="0"/>
+            </a:endParaRPr>
           </a:p>
         </p:txBody>
       </p:sp>
@@ -13240,10 +13354,10 @@
       </p:sp>
       <p:pic>
         <p:nvPicPr>
-          <p:cNvPr id="3" name="Picture 2">
-            <a:extLst>
-              <a:ext uri="{FF2B5EF4-FFF2-40B4-BE49-F238E27FC236}">
-                <a16:creationId xmlns:a16="http://schemas.microsoft.com/office/drawing/2014/main" id="{95189275-7F3B-4A49-80A7-D8DABC7A51EE}"/>
+          <p:cNvPr id="6" name="Picture 5">
+            <a:extLst>
+              <a:ext uri="{FF2B5EF4-FFF2-40B4-BE49-F238E27FC236}">
+                <a16:creationId xmlns:a16="http://schemas.microsoft.com/office/drawing/2014/main" id="{FB80FC40-7600-A705-F1F0-4D4C652F57FB}"/>
               </a:ext>
             </a:extLst>
           </p:cNvPr>
@@ -13260,8 +13374,8 @@
         </p:blipFill>
         <p:spPr>
           <a:xfrm>
-            <a:off x="540644" y="1600823"/>
-            <a:ext cx="10310306" cy="4932938"/>
+            <a:off x="1121229" y="1600822"/>
+            <a:ext cx="9873342" cy="4789091"/>
           </a:xfrm>
           <a:prstGeom prst="rect">
             <a:avLst/>
@@ -13662,47 +13776,21 @@
           </a:p>
         </p:txBody>
       </p:sp>
-      <p:sp>
-        <p:nvSpPr>
-          <p:cNvPr id="3" name="Content Placeholder 2">
-            <a:extLst>
-              <a:ext uri="{FF2B5EF4-FFF2-40B4-BE49-F238E27FC236}">
-                <a16:creationId xmlns:a16="http://schemas.microsoft.com/office/drawing/2014/main" id="{9B6036FE-E69D-95E8-1005-D32A5E5EEBD9}"/>
-              </a:ext>
-            </a:extLst>
-          </p:cNvPr>
-          <p:cNvSpPr>
-            <a:spLocks noGrp="1"/>
-          </p:cNvSpPr>
+      <p:pic>
+        <p:nvPicPr>
+          <p:cNvPr id="4" name="Content Placeholder 3">
+            <a:extLst>
+              <a:ext uri="{FF2B5EF4-FFF2-40B4-BE49-F238E27FC236}">
+                <a16:creationId xmlns:a16="http://schemas.microsoft.com/office/drawing/2014/main" id="{E7141C5D-86BC-A9D9-0CB9-8FB8F0538165}"/>
+              </a:ext>
+            </a:extLst>
+          </p:cNvPr>
+          <p:cNvPicPr>
+            <a:picLocks noGrp="1" noChangeAspect="1"/>
+          </p:cNvPicPr>
           <p:nvPr>
             <p:ph idx="1"/>
           </p:nvPr>
-        </p:nvSpPr>
-        <p:spPr/>
-        <p:txBody>
-          <a:bodyPr/>
-          <a:lstStyle/>
-          <a:p>
-            <a:r>
-              <a:rPr lang="en-GB" dirty="0"/>
-              <a:t>i</a:t>
-            </a:r>
-          </a:p>
-        </p:txBody>
-      </p:sp>
-      <p:pic>
-        <p:nvPicPr>
-          <p:cNvPr id="10" name="Picture 9">
-            <a:extLst>
-              <a:ext uri="{FF2B5EF4-FFF2-40B4-BE49-F238E27FC236}">
-                <a16:creationId xmlns:a16="http://schemas.microsoft.com/office/drawing/2014/main" id="{A1D34708-DC86-4ECA-0321-C0CEF32440D6}"/>
-              </a:ext>
-            </a:extLst>
-          </p:cNvPr>
-          <p:cNvPicPr>
-            <a:picLocks noChangeAspect="1"/>
-          </p:cNvPicPr>
-          <p:nvPr/>
         </p:nvPicPr>
         <p:blipFill>
           <a:blip r:embed="rId3"/>
@@ -13712,12 +13800,9 @@
         </p:blipFill>
         <p:spPr>
           <a:xfrm>
-            <a:off x="540644" y="1384263"/>
-            <a:ext cx="10972800" cy="3243170"/>
+            <a:off x="609599" y="1384263"/>
+            <a:ext cx="10972800" cy="3028175"/>
           </a:xfrm>
-          <a:prstGeom prst="rect">
-            <a:avLst/>
-          </a:prstGeom>
         </p:spPr>
       </p:pic>
     </p:spTree>
@@ -13866,10 +13951,10 @@
       </p:sp>
       <p:pic>
         <p:nvPicPr>
-          <p:cNvPr id="15" name="Content Placeholder 14">
-            <a:extLst>
-              <a:ext uri="{FF2B5EF4-FFF2-40B4-BE49-F238E27FC236}">
-                <a16:creationId xmlns:a16="http://schemas.microsoft.com/office/drawing/2014/main" id="{5DF06358-1271-6A53-FDBE-1C5F755DDFA7}"/>
+          <p:cNvPr id="10" name="Content Placeholder 9">
+            <a:extLst>
+              <a:ext uri="{FF2B5EF4-FFF2-40B4-BE49-F238E27FC236}">
+                <a16:creationId xmlns:a16="http://schemas.microsoft.com/office/drawing/2014/main" id="{E81CAB47-17BA-DD58-782E-FB9175F11C5E}"/>
               </a:ext>
             </a:extLst>
           </p:cNvPr>
@@ -13888,17 +13973,17 @@
         </p:blipFill>
         <p:spPr>
           <a:xfrm>
-            <a:off x="0" y="1384263"/>
-            <a:ext cx="3002896" cy="2582095"/>
+            <a:off x="3636176" y="1581990"/>
+            <a:ext cx="3929050" cy="2311519"/>
           </a:xfrm>
         </p:spPr>
       </p:pic>
       <p:pic>
         <p:nvPicPr>
-          <p:cNvPr id="19" name="Picture 18">
-            <a:extLst>
-              <a:ext uri="{FF2B5EF4-FFF2-40B4-BE49-F238E27FC236}">
-                <a16:creationId xmlns:a16="http://schemas.microsoft.com/office/drawing/2014/main" id="{CA8374B7-A92D-156F-4F9D-CE5A9BEC99BE}"/>
+          <p:cNvPr id="6" name="Picture 5">
+            <a:extLst>
+              <a:ext uri="{FF2B5EF4-FFF2-40B4-BE49-F238E27FC236}">
+                <a16:creationId xmlns:a16="http://schemas.microsoft.com/office/drawing/2014/main" id="{43555015-CF93-A272-1E51-EF74EA9258B6}"/>
               </a:ext>
             </a:extLst>
           </p:cNvPr>
@@ -13915,8 +14000,8 @@
         </p:blipFill>
         <p:spPr>
           <a:xfrm>
-            <a:off x="3002897" y="1422390"/>
-            <a:ext cx="4906238" cy="2302433"/>
+            <a:off x="0" y="1581992"/>
+            <a:ext cx="3516086" cy="2311519"/>
           </a:xfrm>
           <a:prstGeom prst="rect">
             <a:avLst/>
@@ -13925,10 +14010,10 @@
       </p:pic>
       <p:pic>
         <p:nvPicPr>
-          <p:cNvPr id="21" name="Picture 20">
-            <a:extLst>
-              <a:ext uri="{FF2B5EF4-FFF2-40B4-BE49-F238E27FC236}">
-                <a16:creationId xmlns:a16="http://schemas.microsoft.com/office/drawing/2014/main" id="{C4221CFB-006F-CDE2-ABD1-1B5438EDF514}"/>
+          <p:cNvPr id="12" name="Picture 11">
+            <a:extLst>
+              <a:ext uri="{FF2B5EF4-FFF2-40B4-BE49-F238E27FC236}">
+                <a16:creationId xmlns:a16="http://schemas.microsoft.com/office/drawing/2014/main" id="{1500FD19-2446-BC59-FC8E-71B8C4A7CE29}"/>
               </a:ext>
             </a:extLst>
           </p:cNvPr>
@@ -13945,8 +14030,8 @@
         </p:blipFill>
         <p:spPr>
           <a:xfrm>
-            <a:off x="7909135" y="4014845"/>
-            <a:ext cx="4134340" cy="2932034"/>
+            <a:off x="7685316" y="1415050"/>
+            <a:ext cx="4386942" cy="2569121"/>
           </a:xfrm>
           <a:prstGeom prst="rect">
             <a:avLst/>
@@ -13955,10 +14040,10 @@
       </p:pic>
       <p:pic>
         <p:nvPicPr>
-          <p:cNvPr id="23" name="Picture 22">
-            <a:extLst>
-              <a:ext uri="{FF2B5EF4-FFF2-40B4-BE49-F238E27FC236}">
-                <a16:creationId xmlns:a16="http://schemas.microsoft.com/office/drawing/2014/main" id="{B3F3A0CA-DC07-3C72-F7DC-CF48ABFA97F4}"/>
+          <p:cNvPr id="14" name="Picture 13">
+            <a:extLst>
+              <a:ext uri="{FF2B5EF4-FFF2-40B4-BE49-F238E27FC236}">
+                <a16:creationId xmlns:a16="http://schemas.microsoft.com/office/drawing/2014/main" id="{14988EC5-8D08-2920-B442-9133C04B1239}"/>
               </a:ext>
             </a:extLst>
           </p:cNvPr>
@@ -13975,8 +14060,8 @@
         </p:blipFill>
         <p:spPr>
           <a:xfrm>
-            <a:off x="0" y="3984571"/>
-            <a:ext cx="3002896" cy="2730640"/>
+            <a:off x="0" y="4267744"/>
+            <a:ext cx="3516086" cy="2486858"/>
           </a:xfrm>
           <a:prstGeom prst="rect">
             <a:avLst/>
@@ -13985,10 +14070,10 @@
       </p:pic>
       <p:pic>
         <p:nvPicPr>
-          <p:cNvPr id="25" name="Picture 24">
-            <a:extLst>
-              <a:ext uri="{FF2B5EF4-FFF2-40B4-BE49-F238E27FC236}">
-                <a16:creationId xmlns:a16="http://schemas.microsoft.com/office/drawing/2014/main" id="{619D5E71-41BC-FE9F-FFC2-AF13992DAFC6}"/>
+          <p:cNvPr id="17" name="Picture 16">
+            <a:extLst>
+              <a:ext uri="{FF2B5EF4-FFF2-40B4-BE49-F238E27FC236}">
+                <a16:creationId xmlns:a16="http://schemas.microsoft.com/office/drawing/2014/main" id="{32BF58CD-D28E-11D0-F883-6390BA52C45C}"/>
               </a:ext>
             </a:extLst>
           </p:cNvPr>
@@ -14005,8 +14090,8 @@
         </p:blipFill>
         <p:spPr>
           <a:xfrm>
-            <a:off x="7909135" y="1422390"/>
-            <a:ext cx="4061191" cy="2395315"/>
+            <a:off x="3636177" y="4267745"/>
+            <a:ext cx="3929050" cy="2486858"/>
           </a:xfrm>
           <a:prstGeom prst="rect">
             <a:avLst/>
@@ -14015,10 +14100,10 @@
       </p:pic>
       <p:pic>
         <p:nvPicPr>
-          <p:cNvPr id="27" name="Picture 26">
-            <a:extLst>
-              <a:ext uri="{FF2B5EF4-FFF2-40B4-BE49-F238E27FC236}">
-                <a16:creationId xmlns:a16="http://schemas.microsoft.com/office/drawing/2014/main" id="{6166083B-0CD0-6ADA-B002-3FB6AB742939}"/>
+          <p:cNvPr id="20" name="Picture 19">
+            <a:extLst>
+              <a:ext uri="{FF2B5EF4-FFF2-40B4-BE49-F238E27FC236}">
+                <a16:creationId xmlns:a16="http://schemas.microsoft.com/office/drawing/2014/main" id="{DBC9AECD-9345-4522-4C18-2572A583507E}"/>
               </a:ext>
             </a:extLst>
           </p:cNvPr>
@@ -14035,8 +14120,8 @@
         </p:blipFill>
         <p:spPr>
           <a:xfrm>
-            <a:off x="3121819" y="3966358"/>
-            <a:ext cx="4787316" cy="2768742"/>
+            <a:off x="7685316" y="4267743"/>
+            <a:ext cx="4386942" cy="2486857"/>
           </a:xfrm>
           <a:prstGeom prst="rect">
             <a:avLst/>

</xml_diff>